<commit_message>
Add info about assets sources README.md
Edited agilePlan.md, idea.md and Greg Game.pptx
</commit_message>
<xml_diff>
--- a/Gregs Game.pptx
+++ b/Gregs Game.pptx
@@ -7,10 +7,10 @@
     <p:sldMasterId id="2147483687" r:id="rId3"/>
   </p:sldMasterIdLst>
   <p:notesMasterIdLst>
-    <p:notesMasterId r:id="rId15"/>
+    <p:notesMasterId r:id="rId16"/>
   </p:notesMasterIdLst>
   <p:handoutMasterIdLst>
-    <p:handoutMasterId r:id="rId16"/>
+    <p:handoutMasterId r:id="rId17"/>
   </p:handoutMasterIdLst>
   <p:sldIdLst>
     <p:sldId id="256" r:id="rId4"/>
@@ -20,10 +20,11 @@
     <p:sldId id="260" r:id="rId8"/>
     <p:sldId id="267" r:id="rId9"/>
     <p:sldId id="281" r:id="rId10"/>
-    <p:sldId id="266" r:id="rId11"/>
-    <p:sldId id="286" r:id="rId12"/>
-    <p:sldId id="271" r:id="rId13"/>
-    <p:sldId id="262" r:id="rId14"/>
+    <p:sldId id="287" r:id="rId11"/>
+    <p:sldId id="266" r:id="rId12"/>
+    <p:sldId id="286" r:id="rId13"/>
+    <p:sldId id="271" r:id="rId14"/>
+    <p:sldId id="262" r:id="rId15"/>
   </p:sldIdLst>
   <p:sldSz cx="10080625" cy="5670550"/>
   <p:notesSz cx="7559675" cy="10691813"/>
@@ -224,7 +225,7 @@
           <a:p>
             <a:fld id="{1C828C2A-D51E-4975-98FA-CAD22EC2BB6A}" type="datetime1">
               <a:rPr lang="cs-CZ" smtClean="0"/>
-              <a:t>17.06.2024</a:t>
+              <a:t>19.06.2024</a:t>
             </a:fld>
             <a:endParaRPr lang="cs-CZ"/>
           </a:p>
@@ -402,7 +403,7 @@
           <a:p>
             <a:fld id="{4A0CC1EB-4F40-4B67-94F0-195D437C8C00}" type="datetime1">
               <a:rPr lang="cs-CZ" smtClean="0"/>
-              <a:t>17.06.2024</a:t>
+              <a:t>19.06.2024</a:t>
             </a:fld>
             <a:endParaRPr lang="cs-CZ"/>
           </a:p>
@@ -783,6 +784,67 @@
     </p:spTree>
     <p:extLst>
       <p:ext uri="{BB962C8B-B14F-4D97-AF65-F5344CB8AC3E}">
+        <p14:creationId xmlns:p14="http://schemas.microsoft.com/office/powerpoint/2010/main" val="867566795"/>
+      </p:ext>
+    </p:extLst>
+  </p:cSld>
+  <p:clrMapOvr>
+    <a:masterClrMapping/>
+  </p:clrMapOvr>
+</p:notes>
+</file>
+
+<file path=ppt/notesSlides/notesSlide11.xml><?xml version="1.0" encoding="utf-8"?>
+<p:notes xmlns:a="http://schemas.openxmlformats.org/drawingml/2006/main" xmlns:r="http://schemas.openxmlformats.org/officeDocument/2006/relationships" xmlns:p="http://schemas.openxmlformats.org/presentationml/2006/main">
+  <p:cSld>
+    <p:spTree>
+      <p:nvGrpSpPr>
+        <p:cNvPr id="1" name=""/>
+        <p:cNvGrpSpPr/>
+        <p:nvPr/>
+      </p:nvGrpSpPr>
+      <p:grpSpPr>
+        <a:xfrm>
+          <a:off x="0" y="0"/>
+          <a:ext cx="0" cy="0"/>
+          <a:chOff x="0" y="0"/>
+          <a:chExt cx="0" cy="0"/>
+        </a:xfrm>
+      </p:grpSpPr>
+      <p:sp>
+        <p:nvSpPr>
+          <p:cNvPr id="2" name="Zástupný symbol pro obrázek snímku 1"/>
+          <p:cNvSpPr>
+            <a:spLocks noGrp="1" noRot="1" noChangeAspect="1"/>
+          </p:cNvSpPr>
+          <p:nvPr>
+            <p:ph type="sldImg"/>
+          </p:nvPr>
+        </p:nvSpPr>
+        <p:spPr/>
+      </p:sp>
+      <p:sp>
+        <p:nvSpPr>
+          <p:cNvPr id="3" name="Zástupný symbol pro poznámky 2"/>
+          <p:cNvSpPr>
+            <a:spLocks noGrp="1"/>
+          </p:cNvSpPr>
+          <p:nvPr>
+            <p:ph type="body" idx="1"/>
+          </p:nvPr>
+        </p:nvSpPr>
+        <p:spPr/>
+        <p:txBody>
+          <a:bodyPr/>
+          <a:lstStyle/>
+          <a:p>
+            <a:endParaRPr lang="cs-CZ"/>
+          </a:p>
+        </p:txBody>
+      </p:sp>
+    </p:spTree>
+    <p:extLst>
+      <p:ext uri="{BB962C8B-B14F-4D97-AF65-F5344CB8AC3E}">
         <p14:creationId xmlns:p14="http://schemas.microsoft.com/office/powerpoint/2010/main" val="682961947"/>
       </p:ext>
     </p:extLst>
@@ -793,7 +855,7 @@
 </p:notes>
 </file>
 
-<file path=ppt/notesSlides/notesSlide11.xml><?xml version="1.0" encoding="utf-8"?>
+<file path=ppt/notesSlides/notesSlide12.xml><?xml version="1.0" encoding="utf-8"?>
 <p:notes xmlns:a="http://schemas.openxmlformats.org/drawingml/2006/main" xmlns:r="http://schemas.openxmlformats.org/officeDocument/2006/relationships" xmlns:p="http://schemas.openxmlformats.org/presentationml/2006/main">
   <p:cSld>
     <p:spTree>
@@ -1272,7 +1334,7 @@
     </p:spTree>
     <p:extLst>
       <p:ext uri="{BB962C8B-B14F-4D97-AF65-F5344CB8AC3E}">
-        <p14:creationId xmlns:p14="http://schemas.microsoft.com/office/powerpoint/2010/main" val="711350589"/>
+        <p14:creationId xmlns:p14="http://schemas.microsoft.com/office/powerpoint/2010/main" val="1840379564"/>
       </p:ext>
     </p:extLst>
   </p:cSld>
@@ -1333,7 +1395,7 @@
     </p:spTree>
     <p:extLst>
       <p:ext uri="{BB962C8B-B14F-4D97-AF65-F5344CB8AC3E}">
-        <p14:creationId xmlns:p14="http://schemas.microsoft.com/office/powerpoint/2010/main" val="867566795"/>
+        <p14:creationId xmlns:p14="http://schemas.microsoft.com/office/powerpoint/2010/main" val="711350589"/>
       </p:ext>
     </p:extLst>
   </p:cSld>
@@ -7608,8 +7670,8 @@
         </p:nvSpPr>
         <p:spPr>
           <a:xfrm>
-            <a:off x="164892" y="410746"/>
-            <a:ext cx="6478560" cy="492443"/>
+            <a:off x="134912" y="410746"/>
+            <a:ext cx="9233554" cy="492443"/>
           </a:xfrm>
           <a:prstGeom prst="rect">
             <a:avLst/>
@@ -7632,7 +7694,7 @@
           <a:fontRef idx="minor"/>
         </p:style>
         <p:txBody>
-          <a:bodyPr lIns="0" tIns="0" rIns="0" bIns="0">
+          <a:bodyPr wrap="square" lIns="0" tIns="0" rIns="0" bIns="0">
             <a:spAutoFit/>
           </a:bodyPr>
           <a:lstStyle/>
@@ -7649,9 +7711,461 @@
                 </a:solidFill>
                 <a:ea typeface="DejaVu Sans"/>
               </a:rPr>
+              <a:t>5 / Ukázky ze hry</a:t>
+            </a:r>
+          </a:p>
+        </p:txBody>
+      </p:sp>
+      <p:pic>
+        <p:nvPicPr>
+          <p:cNvPr id="3" name="Obrázek 2">
+            <a:extLst>
+              <a:ext uri="{FF2B5EF4-FFF2-40B4-BE49-F238E27FC236}">
+                <a16:creationId xmlns:a16="http://schemas.microsoft.com/office/drawing/2014/main" id="{70BEEE3A-55F3-D893-18F7-AE3A8688162C}"/>
+              </a:ext>
+            </a:extLst>
+          </p:cNvPr>
+          <p:cNvPicPr>
+            <a:picLocks noChangeAspect="1"/>
+          </p:cNvPicPr>
+          <p:nvPr/>
+        </p:nvPicPr>
+        <p:blipFill>
+          <a:blip r:embed="rId3">
+            <a:extLst>
+              <a:ext uri="{28A0092B-C50C-407E-A947-70E740481C1C}">
+                <a14:useLocalDpi xmlns:a14="http://schemas.microsoft.com/office/drawing/2010/main" val="0"/>
+              </a:ext>
+            </a:extLst>
+          </a:blip>
+          <a:stretch>
+            <a:fillRect/>
+          </a:stretch>
+        </p:blipFill>
+        <p:spPr>
+          <a:xfrm>
+            <a:off x="1019389" y="903188"/>
+            <a:ext cx="8041845" cy="4541282"/>
+          </a:xfrm>
+          <a:prstGeom prst="rect">
+            <a:avLst/>
+          </a:prstGeom>
+        </p:spPr>
+      </p:pic>
+    </p:spTree>
+    <p:extLst>
+      <p:ext uri="{BB962C8B-B14F-4D97-AF65-F5344CB8AC3E}">
+        <p14:creationId xmlns:p14="http://schemas.microsoft.com/office/powerpoint/2010/main" val="3623076672"/>
+      </p:ext>
+    </p:extLst>
+  </p:cSld>
+  <p:clrMapOvr>
+    <a:masterClrMapping/>
+  </p:clrMapOvr>
+</p:sld>
+</file>
+
+<file path=ppt/slides/slide11.xml><?xml version="1.0" encoding="utf-8"?>
+<p:sld xmlns:a="http://schemas.openxmlformats.org/drawingml/2006/main" xmlns:r="http://schemas.openxmlformats.org/officeDocument/2006/relationships" xmlns:p="http://schemas.openxmlformats.org/presentationml/2006/main">
+  <p:cSld>
+    <p:spTree>
+      <p:nvGrpSpPr>
+        <p:cNvPr id="1" name=""/>
+        <p:cNvGrpSpPr/>
+        <p:nvPr/>
+      </p:nvGrpSpPr>
+      <p:grpSpPr>
+        <a:xfrm>
+          <a:off x="0" y="0"/>
+          <a:ext cx="0" cy="0"/>
+          <a:chOff x="0" y="0"/>
+          <a:chExt cx="0" cy="0"/>
+        </a:xfrm>
+      </p:grpSpPr>
+      <p:sp>
+        <p:nvSpPr>
+          <p:cNvPr id="164" name="CustomShape 1"/>
+          <p:cNvSpPr/>
+          <p:nvPr/>
+        </p:nvSpPr>
+        <p:spPr>
+          <a:xfrm>
+            <a:off x="566640" y="226080"/>
+            <a:ext cx="9070560" cy="184666"/>
+          </a:xfrm>
+          <a:prstGeom prst="rect">
+            <a:avLst/>
+          </a:prstGeom>
+          <a:noFill/>
+          <a:ln>
+            <a:noFill/>
+          </a:ln>
+        </p:spPr>
+        <p:style>
+          <a:lnRef idx="0">
+            <a:scrgbClr r="0" g="0" b="0"/>
+          </a:lnRef>
+          <a:fillRef idx="0">
+            <a:scrgbClr r="0" g="0" b="0"/>
+          </a:fillRef>
+          <a:effectRef idx="0">
+            <a:scrgbClr r="0" g="0" b="0"/>
+          </a:effectRef>
+          <a:fontRef idx="minor"/>
+        </p:style>
+        <p:txBody>
+          <a:bodyPr lIns="0" tIns="0" rIns="0" bIns="0">
+            <a:spAutoFit/>
+          </a:bodyPr>
+          <a:lstStyle/>
+          <a:p>
+            <a:pPr>
+              <a:lnSpc>
+                <a:spcPct val="100000"/>
+              </a:lnSpc>
+            </a:pPr>
+            <a:r>
+              <a:rPr lang="cs-CZ" sz="1200" b="1" strike="noStrike" spc="-1">
+                <a:solidFill>
+                  <a:srgbClr val="E8A202"/>
+                </a:solidFill>
+                <a:ea typeface="DejaVu Sans"/>
+              </a:rPr>
+              <a:t>Praktické využití vodopádového modelu</a:t>
+            </a:r>
+            <a:endParaRPr lang="cs-CZ" sz="1200" b="0" strike="noStrike" spc="-1"/>
+          </a:p>
+        </p:txBody>
+      </p:sp>
+      <p:sp>
+        <p:nvSpPr>
+          <p:cNvPr id="165" name="CustomShape 2"/>
+          <p:cNvSpPr/>
+          <p:nvPr/>
+        </p:nvSpPr>
+        <p:spPr>
+          <a:xfrm>
+            <a:off x="164892" y="410746"/>
+            <a:ext cx="6478560" cy="492443"/>
+          </a:xfrm>
+          <a:prstGeom prst="rect">
+            <a:avLst/>
+          </a:prstGeom>
+          <a:noFill/>
+          <a:ln>
+            <a:noFill/>
+          </a:ln>
+        </p:spPr>
+        <p:style>
+          <a:lnRef idx="0">
+            <a:scrgbClr r="0" g="0" b="0"/>
+          </a:lnRef>
+          <a:fillRef idx="0">
+            <a:scrgbClr r="0" g="0" b="0"/>
+          </a:fillRef>
+          <a:effectRef idx="0">
+            <a:scrgbClr r="0" g="0" b="0"/>
+          </a:effectRef>
+          <a:fontRef idx="minor"/>
+        </p:style>
+        <p:txBody>
+          <a:bodyPr lIns="0" tIns="0" rIns="0" bIns="0">
+            <a:spAutoFit/>
+          </a:bodyPr>
+          <a:lstStyle/>
+          <a:p>
+            <a:pPr>
+              <a:lnSpc>
+                <a:spcPct val="100000"/>
+              </a:lnSpc>
+            </a:pPr>
+            <a:r>
+              <a:rPr lang="cs-CZ" sz="3200" b="1" strike="noStrike" spc="-1">
+                <a:solidFill>
+                  <a:srgbClr val="E8A202"/>
+                </a:solidFill>
+                <a:ea typeface="DejaVu Sans"/>
+              </a:rPr>
               <a:t>6 / Závěr</a:t>
             </a:r>
             <a:endParaRPr lang="cs-CZ" sz="3200" b="0" strike="noStrike" spc="-1"/>
+          </a:p>
+        </p:txBody>
+      </p:sp>
+      <p:sp>
+        <p:nvSpPr>
+          <p:cNvPr id="2" name="TextovéPole 1">
+            <a:extLst>
+              <a:ext uri="{FF2B5EF4-FFF2-40B4-BE49-F238E27FC236}">
+                <a16:creationId xmlns:a16="http://schemas.microsoft.com/office/drawing/2014/main" id="{130FAF46-C69B-9057-9296-CBC1B386C3EB}"/>
+              </a:ext>
+            </a:extLst>
+          </p:cNvPr>
+          <p:cNvSpPr txBox="1"/>
+          <p:nvPr/>
+        </p:nvSpPr>
+        <p:spPr>
+          <a:xfrm>
+            <a:off x="164892" y="1087855"/>
+            <a:ext cx="8184629" cy="4619213"/>
+          </a:xfrm>
+          <a:prstGeom prst="rect">
+            <a:avLst/>
+          </a:prstGeom>
+          <a:noFill/>
+        </p:spPr>
+        <p:txBody>
+          <a:bodyPr wrap="square" rtlCol="0">
+            <a:spAutoFit/>
+          </a:bodyPr>
+          <a:lstStyle/>
+          <a:p>
+            <a:pPr>
+              <a:lnSpc>
+                <a:spcPts val="1400"/>
+              </a:lnSpc>
+              <a:spcBef>
+                <a:spcPts val="1060"/>
+              </a:spcBef>
+            </a:pPr>
+            <a:r>
+              <a:rPr lang="cs-CZ" sz="1600">
+                <a:latin typeface="Times New Roman" panose="02020603050405020304" pitchFamily="18" charset="0"/>
+              </a:rPr>
+              <a:t>Roman:</a:t>
+            </a:r>
+          </a:p>
+          <a:p>
+            <a:pPr marL="1200150" lvl="2" indent="-285750">
+              <a:lnSpc>
+                <a:spcPts val="1400"/>
+              </a:lnSpc>
+              <a:spcBef>
+                <a:spcPts val="1060"/>
+              </a:spcBef>
+              <a:buFont typeface="Arial" panose="020B0604020202020204" pitchFamily="34" charset="0"/>
+              <a:buChar char="•"/>
+            </a:pPr>
+            <a:r>
+              <a:rPr lang="cs-CZ" sz="1600">
+                <a:latin typeface="Times New Roman" panose="02020603050405020304" pitchFamily="18" charset="0"/>
+              </a:rPr>
+              <a:t>Inicializace nastavení hry a uživatelského rozhraní</a:t>
+            </a:r>
+          </a:p>
+          <a:p>
+            <a:pPr marL="1200150" lvl="2" indent="-285750">
+              <a:lnSpc>
+                <a:spcPts val="1400"/>
+              </a:lnSpc>
+              <a:spcBef>
+                <a:spcPts val="1060"/>
+              </a:spcBef>
+              <a:buFont typeface="Arial" panose="020B0604020202020204" pitchFamily="34" charset="0"/>
+              <a:buChar char="•"/>
+            </a:pPr>
+            <a:r>
+              <a:rPr lang="cs-CZ" sz="1600">
+                <a:latin typeface="Times New Roman" panose="02020603050405020304" pitchFamily="18" charset="0"/>
+              </a:rPr>
+              <a:t>Pohyb hráče a zpracování vstupů</a:t>
+            </a:r>
+          </a:p>
+          <a:p>
+            <a:pPr marL="1200150" lvl="2" indent="-285750">
+              <a:lnSpc>
+                <a:spcPts val="1400"/>
+              </a:lnSpc>
+              <a:spcBef>
+                <a:spcPts val="1060"/>
+              </a:spcBef>
+              <a:buFont typeface="Arial" panose="020B0604020202020204" pitchFamily="34" charset="0"/>
+              <a:buChar char="•"/>
+            </a:pPr>
+            <a:r>
+              <a:rPr lang="cs-CZ" sz="1600">
+                <a:latin typeface="Times New Roman" panose="02020603050405020304" pitchFamily="18" charset="0"/>
+              </a:rPr>
+              <a:t>Implementace herního časovače</a:t>
+            </a:r>
+          </a:p>
+          <a:p>
+            <a:pPr marL="1200150" lvl="2" indent="-285750">
+              <a:lnSpc>
+                <a:spcPts val="1400"/>
+              </a:lnSpc>
+              <a:spcBef>
+                <a:spcPts val="1060"/>
+              </a:spcBef>
+              <a:buFont typeface="Arial" panose="020B0604020202020204" pitchFamily="34" charset="0"/>
+              <a:buChar char="•"/>
+            </a:pPr>
+            <a:r>
+              <a:rPr lang="cs-CZ" sz="1600">
+                <a:latin typeface="Times New Roman" panose="02020603050405020304" pitchFamily="18" charset="0"/>
+              </a:rPr>
+              <a:t>Podmínky ukončení hry</a:t>
+            </a:r>
+          </a:p>
+          <a:p>
+            <a:pPr marL="1200150" lvl="2" indent="-285750">
+              <a:lnSpc>
+                <a:spcPts val="1400"/>
+              </a:lnSpc>
+              <a:spcBef>
+                <a:spcPts val="1060"/>
+              </a:spcBef>
+              <a:buFont typeface="Arial" panose="020B0604020202020204" pitchFamily="34" charset="0"/>
+              <a:buChar char="•"/>
+            </a:pPr>
+            <a:r>
+              <a:rPr lang="cs-CZ" sz="1600">
+                <a:latin typeface="Times New Roman" panose="02020603050405020304" pitchFamily="18" charset="0"/>
+              </a:rPr>
+              <a:t>Opravy chyb a optimalizace</a:t>
+            </a:r>
+          </a:p>
+          <a:p>
+            <a:pPr marL="1200150" lvl="2" indent="-285750">
+              <a:lnSpc>
+                <a:spcPts val="1400"/>
+              </a:lnSpc>
+              <a:spcBef>
+                <a:spcPts val="1060"/>
+              </a:spcBef>
+              <a:buFont typeface="Arial" panose="020B0604020202020204" pitchFamily="34" charset="0"/>
+              <a:buChar char="•"/>
+            </a:pPr>
+            <a:r>
+              <a:rPr lang="cs-CZ" sz="1600">
+                <a:latin typeface="Times New Roman" panose="02020603050405020304" pitchFamily="18" charset="0"/>
+              </a:rPr>
+              <a:t>Příprava prezentace projektu</a:t>
+            </a:r>
+          </a:p>
+          <a:p>
+            <a:pPr>
+              <a:lnSpc>
+                <a:spcPts val="1400"/>
+              </a:lnSpc>
+              <a:spcBef>
+                <a:spcPts val="1060"/>
+              </a:spcBef>
+            </a:pPr>
+            <a:r>
+              <a:rPr lang="cs-CZ" sz="1600">
+                <a:latin typeface="Times New Roman" panose="02020603050405020304" pitchFamily="18" charset="0"/>
+              </a:rPr>
+              <a:t>Michal:</a:t>
+            </a:r>
+          </a:p>
+          <a:p>
+            <a:pPr marL="1200150" lvl="2" indent="-285750">
+              <a:lnSpc>
+                <a:spcPts val="1400"/>
+              </a:lnSpc>
+              <a:spcBef>
+                <a:spcPts val="1060"/>
+              </a:spcBef>
+              <a:buFont typeface="Arial" panose="020B0604020202020204" pitchFamily="34" charset="0"/>
+              <a:buChar char="•"/>
+            </a:pPr>
+            <a:r>
+              <a:rPr lang="cs-CZ" sz="1600">
+                <a:latin typeface="Times New Roman" panose="02020603050405020304" pitchFamily="18" charset="0"/>
+              </a:rPr>
+              <a:t>Zvukový design</a:t>
+            </a:r>
+          </a:p>
+          <a:p>
+            <a:pPr marL="1200150" lvl="2" indent="-285750">
+              <a:lnSpc>
+                <a:spcPts val="1400"/>
+              </a:lnSpc>
+              <a:spcBef>
+                <a:spcPts val="1060"/>
+              </a:spcBef>
+              <a:buFont typeface="Arial" panose="020B0604020202020204" pitchFamily="34" charset="0"/>
+              <a:buChar char="•"/>
+            </a:pPr>
+            <a:r>
+              <a:rPr lang="cs-CZ" sz="1600">
+                <a:latin typeface="Times New Roman" panose="02020603050405020304" pitchFamily="18" charset="0"/>
+              </a:rPr>
+              <a:t>Detekce kolizí</a:t>
+            </a:r>
+          </a:p>
+          <a:p>
+            <a:pPr marL="1200150" lvl="2" indent="-285750">
+              <a:lnSpc>
+                <a:spcPts val="1400"/>
+              </a:lnSpc>
+              <a:spcBef>
+                <a:spcPts val="1060"/>
+              </a:spcBef>
+              <a:buFont typeface="Arial" panose="020B0604020202020204" pitchFamily="34" charset="0"/>
+              <a:buChar char="•"/>
+            </a:pPr>
+            <a:r>
+              <a:rPr lang="cs-CZ" sz="1600">
+                <a:latin typeface="Times New Roman" panose="02020603050405020304" pitchFamily="18" charset="0"/>
+              </a:rPr>
+              <a:t>Vizualizace koláče</a:t>
+            </a:r>
+          </a:p>
+          <a:p>
+            <a:pPr marL="1200150" lvl="2" indent="-285750">
+              <a:lnSpc>
+                <a:spcPts val="1400"/>
+              </a:lnSpc>
+              <a:spcBef>
+                <a:spcPts val="1060"/>
+              </a:spcBef>
+              <a:buFont typeface="Arial" panose="020B0604020202020204" pitchFamily="34" charset="0"/>
+              <a:buChar char="•"/>
+            </a:pPr>
+            <a:r>
+              <a:rPr lang="cs-CZ" sz="1600">
+                <a:latin typeface="Times New Roman" panose="02020603050405020304" pitchFamily="18" charset="0"/>
+              </a:rPr>
+              <a:t>Vylepšení uživatelského rozhraní</a:t>
+            </a:r>
+          </a:p>
+          <a:p>
+            <a:pPr marL="1200150" lvl="2" indent="-285750">
+              <a:lnSpc>
+                <a:spcPts val="1400"/>
+              </a:lnSpc>
+              <a:spcBef>
+                <a:spcPts val="1060"/>
+              </a:spcBef>
+              <a:buFont typeface="Arial" panose="020B0604020202020204" pitchFamily="34" charset="0"/>
+              <a:buChar char="•"/>
+            </a:pPr>
+            <a:r>
+              <a:rPr lang="cs-CZ" sz="1600">
+                <a:latin typeface="Times New Roman" panose="02020603050405020304" pitchFamily="18" charset="0"/>
+              </a:rPr>
+              <a:t>Základní herní logika</a:t>
+            </a:r>
+          </a:p>
+          <a:p>
+            <a:pPr marL="1200150" lvl="2" indent="-285750">
+              <a:lnSpc>
+                <a:spcPts val="1400"/>
+              </a:lnSpc>
+              <a:spcBef>
+                <a:spcPts val="1060"/>
+              </a:spcBef>
+              <a:buFont typeface="Arial" panose="020B0604020202020204" pitchFamily="34" charset="0"/>
+              <a:buChar char="•"/>
+            </a:pPr>
+            <a:r>
+              <a:rPr lang="cs-CZ" sz="1600">
+                <a:latin typeface="Times New Roman" panose="02020603050405020304" pitchFamily="18" charset="0"/>
+              </a:rPr>
+              <a:t>Příprava prezentace projektu</a:t>
+            </a:r>
           </a:p>
         </p:txBody>
       </p:sp>
@@ -7668,7 +8182,7 @@
 </p:sld>
 </file>
 
-<file path=ppt/slides/slide11.xml><?xml version="1.0" encoding="utf-8"?>
+<file path=ppt/slides/slide12.xml><?xml version="1.0" encoding="utf-8"?>
 <p:sld xmlns:a="http://schemas.openxmlformats.org/drawingml/2006/main" xmlns:r="http://schemas.openxmlformats.org/officeDocument/2006/relationships" xmlns:p="http://schemas.openxmlformats.org/presentationml/2006/main">
   <p:cSld>
     <p:bg>
@@ -9202,7 +9716,7 @@
         <p:spPr>
           <a:xfrm>
             <a:off x="134911" y="1057998"/>
-            <a:ext cx="9811063" cy="1185453"/>
+            <a:ext cx="9811063" cy="1545551"/>
           </a:xfrm>
           <a:prstGeom prst="rect">
             <a:avLst/>
@@ -9274,7 +9788,7 @@
               <a:rPr lang="cs-CZ">
                 <a:latin typeface="Times New Roman" panose="02020603050405020304" pitchFamily="18" charset="0"/>
               </a:rPr>
-              <a:t>Myš se pohybuje po prostředí a snaží se sníst kousky dortu dříve, než je hráč stihne posbírat. Myš se pohybuje po částečně náhodné dráze, takže je nepředvídatelné a náročné se jí vyhnout.</a:t>
+              <a:t>Myš se pohybuje po prostředí ve třech módech. Snaží se sníst kousky dortu dříve, než je hráč stihne posbírat. Myš se pohybuje po částečně náhodné dráze, takže je nepředvídatelné a náročné se jí vyhnout.</a:t>
             </a:r>
           </a:p>
         </p:txBody>
@@ -9423,7 +9937,7 @@
         <p:spPr>
           <a:xfrm>
             <a:off x="127416" y="1057998"/>
-            <a:ext cx="9721122" cy="3792833"/>
+            <a:ext cx="9721122" cy="4534190"/>
           </a:xfrm>
           <a:prstGeom prst="rect">
             <a:avLst/>
@@ -9497,6 +10011,30 @@
               <a:rPr lang="cs-CZ">
                 <a:latin typeface="Times New Roman" panose="02020603050405020304" pitchFamily="18" charset="0"/>
               </a:rPr>
+              <a:t>O</a:t>
+            </a:r>
+            <a:r>
+              <a:rPr lang="en-US">
+                <a:latin typeface="Times New Roman" panose="02020603050405020304" pitchFamily="18" charset="0"/>
+              </a:rPr>
+              <a:t>pen-source herní engin</a:t>
+            </a:r>
+            <a:r>
+              <a:rPr lang="cs-CZ">
+                <a:latin typeface="Times New Roman" panose="02020603050405020304" pitchFamily="18" charset="0"/>
+              </a:rPr>
+              <a:t>e</a:t>
+            </a:r>
+            <a:r>
+              <a:rPr lang="en-US">
+                <a:latin typeface="Times New Roman" panose="02020603050405020304" pitchFamily="18" charset="0"/>
+              </a:rPr>
+              <a:t> </a:t>
+            </a:r>
+            <a:r>
+              <a:rPr lang="cs-CZ">
+                <a:latin typeface="Times New Roman" panose="02020603050405020304" pitchFamily="18" charset="0"/>
+              </a:rPr>
               <a:t>Godot Engine v4.2.1.stable.mono.official [b09f793f5]</a:t>
             </a:r>
           </a:p>
@@ -9522,7 +10060,7 @@
               <a:rPr lang="cs-CZ">
                 <a:latin typeface="Times New Roman" panose="02020603050405020304" pitchFamily="18" charset="0"/>
               </a:rPr>
-              <a:t>Jazyk C#</a:t>
+              <a:t>Skriptování v jazyce C#, který poskytuje robustní programovací možnosti pro vývoj her</a:t>
             </a:r>
           </a:p>
           <a:p>
@@ -9549,9 +10087,9 @@
             </a:r>
           </a:p>
           <a:p>
-            <a:pPr marL="1200150" lvl="3" indent="-285750">
+            <a:pPr marL="1200150" lvl="2" indent="-285750">
               <a:lnSpc>
-                <a:spcPct val="130000"/>
+                <a:spcPts val="1000"/>
               </a:lnSpc>
               <a:spcBef>
                 <a:spcPts val="1060"/>
@@ -9567,16 +10105,16 @@
               </a:tabLst>
             </a:pPr>
             <a:r>
-              <a:rPr lang="cs-CZ">
+              <a:rPr lang="cs-CZ" sz="1600">
                 <a:latin typeface="Times New Roman" panose="02020603050405020304" pitchFamily="18" charset="0"/>
               </a:rPr>
-              <a:t>Asset?</a:t>
-            </a:r>
-          </a:p>
-          <a:p>
-            <a:pPr marL="0" lvl="1">
+              <a:t>flowerone.png – Elena Rašková</a:t>
+            </a:r>
+          </a:p>
+          <a:p>
+            <a:pPr marL="1200150" lvl="2" indent="-285750">
               <a:lnSpc>
-                <a:spcPct val="130000"/>
+                <a:spcPts val="1000"/>
               </a:lnSpc>
               <a:spcBef>
                 <a:spcPts val="1060"/>
@@ -9584,19 +10122,24 @@
               <a:spcAft>
                 <a:spcPts val="600"/>
               </a:spcAft>
+              <a:buFont typeface="Arial" panose="020B0604020202020204" pitchFamily="34" charset="0"/>
+              <a:buChar char="•"/>
               <a:tabLst>
                 <a:tab pos="365760" algn="l"/>
                 <a:tab pos="540385" algn="l"/>
               </a:tabLst>
             </a:pPr>
-            <a:endParaRPr lang="cs-CZ" b="1">
-              <a:latin typeface="Times New Roman" panose="02020603050405020304" pitchFamily="18" charset="0"/>
-            </a:endParaRPr>
-          </a:p>
-          <a:p>
-            <a:pPr marL="0" lvl="1">
+            <a:r>
+              <a:rPr lang="cs-CZ" sz="1600">
+                <a:latin typeface="Times New Roman" panose="02020603050405020304" pitchFamily="18" charset="0"/>
+              </a:rPr>
+              <a:t>flowertwo.png – Elena Rašková</a:t>
+            </a:r>
+          </a:p>
+          <a:p>
+            <a:pPr marL="1200150" lvl="2" indent="-285750">
               <a:lnSpc>
-                <a:spcPct val="130000"/>
+                <a:spcPts val="1000"/>
               </a:lnSpc>
               <a:spcBef>
                 <a:spcPts val="1060"/>
@@ -9604,14 +10147,119 @@
               <a:spcAft>
                 <a:spcPts val="600"/>
               </a:spcAft>
+              <a:buFont typeface="Arial" panose="020B0604020202020204" pitchFamily="34" charset="0"/>
+              <a:buChar char="•"/>
               <a:tabLst>
                 <a:tab pos="365760" algn="l"/>
                 <a:tab pos="540385" algn="l"/>
               </a:tabLst>
             </a:pPr>
-            <a:endParaRPr lang="cs-CZ">
-              <a:latin typeface="Times New Roman" panose="02020603050405020304" pitchFamily="18" charset="0"/>
-            </a:endParaRPr>
+            <a:r>
+              <a:rPr lang="cs-CZ" sz="1600">
+                <a:latin typeface="Times New Roman" panose="02020603050405020304" pitchFamily="18" charset="0"/>
+              </a:rPr>
+              <a:t>food.png – Elena Rašková</a:t>
+            </a:r>
+          </a:p>
+          <a:p>
+            <a:pPr marL="1200150" lvl="2" indent="-285750">
+              <a:lnSpc>
+                <a:spcPts val="1000"/>
+              </a:lnSpc>
+              <a:spcBef>
+                <a:spcPts val="1060"/>
+              </a:spcBef>
+              <a:spcAft>
+                <a:spcPts val="600"/>
+              </a:spcAft>
+              <a:buFont typeface="Arial" panose="020B0604020202020204" pitchFamily="34" charset="0"/>
+              <a:buChar char="•"/>
+              <a:tabLst>
+                <a:tab pos="365760" algn="l"/>
+                <a:tab pos="540385" algn="l"/>
+              </a:tabLst>
+            </a:pPr>
+            <a:r>
+              <a:rPr lang="cs-CZ" sz="1600">
+                <a:latin typeface="Times New Roman" panose="02020603050405020304" pitchFamily="18" charset="0"/>
+              </a:rPr>
+              <a:t>mouse.png – Elena Rašková</a:t>
+            </a:r>
+          </a:p>
+          <a:p>
+            <a:pPr marL="1200150" lvl="2" indent="-285750">
+              <a:lnSpc>
+                <a:spcPts val="1000"/>
+              </a:lnSpc>
+              <a:spcBef>
+                <a:spcPts val="1060"/>
+              </a:spcBef>
+              <a:spcAft>
+                <a:spcPts val="600"/>
+              </a:spcAft>
+              <a:buFont typeface="Arial" panose="020B0604020202020204" pitchFamily="34" charset="0"/>
+              <a:buChar char="•"/>
+              <a:tabLst>
+                <a:tab pos="365760" algn="l"/>
+                <a:tab pos="540385" algn="l"/>
+              </a:tabLst>
+            </a:pPr>
+            <a:r>
+              <a:rPr lang="cs-CZ" sz="1600">
+                <a:latin typeface="Times New Roman" panose="02020603050405020304" pitchFamily="18" charset="0"/>
+              </a:rPr>
+              <a:t>noun-danger.svg</a:t>
+            </a:r>
+          </a:p>
+          <a:p>
+            <a:pPr marL="1200150" lvl="2" indent="-285750">
+              <a:lnSpc>
+                <a:spcPts val="1000"/>
+              </a:lnSpc>
+              <a:spcBef>
+                <a:spcPts val="1060"/>
+              </a:spcBef>
+              <a:spcAft>
+                <a:spcPts val="600"/>
+              </a:spcAft>
+              <a:buFont typeface="Arial" panose="020B0604020202020204" pitchFamily="34" charset="0"/>
+              <a:buChar char="•"/>
+              <a:tabLst>
+                <a:tab pos="365760" algn="l"/>
+                <a:tab pos="540385" algn="l"/>
+              </a:tabLst>
+            </a:pPr>
+            <a:r>
+              <a:rPr lang="cs-CZ" sz="1600">
+                <a:latin typeface="Times New Roman" panose="02020603050405020304" pitchFamily="18" charset="0"/>
+              </a:rPr>
+              <a:t>noun-danger-border.svg</a:t>
+            </a:r>
+          </a:p>
+          <a:p>
+            <a:pPr marL="1200150" lvl="2" indent="-285750">
+              <a:lnSpc>
+                <a:spcPts val="1000"/>
+              </a:lnSpc>
+              <a:spcBef>
+                <a:spcPts val="1060"/>
+              </a:spcBef>
+              <a:spcAft>
+                <a:spcPts val="600"/>
+              </a:spcAft>
+              <a:buFont typeface="Arial" panose="020B0604020202020204" pitchFamily="34" charset="0"/>
+              <a:buChar char="•"/>
+              <a:tabLst>
+                <a:tab pos="365760" algn="l"/>
+                <a:tab pos="540385" algn="l"/>
+              </a:tabLst>
+            </a:pPr>
+            <a:r>
+              <a:rPr lang="cs-CZ" sz="1600">
+                <a:latin typeface="Times New Roman" panose="02020603050405020304" pitchFamily="18" charset="0"/>
+              </a:rPr>
+              <a:t>noun-mute.svg</a:t>
+            </a:r>
           </a:p>
         </p:txBody>
       </p:sp>
@@ -9755,6 +10403,358 @@
           </a:p>
         </p:txBody>
       </p:sp>
+      <p:sp>
+        <p:nvSpPr>
+          <p:cNvPr id="2" name="TextovéPole 1">
+            <a:extLst>
+              <a:ext uri="{FF2B5EF4-FFF2-40B4-BE49-F238E27FC236}">
+                <a16:creationId xmlns:a16="http://schemas.microsoft.com/office/drawing/2014/main" id="{B3A9FEB0-995F-889E-E610-014FD9776C52}"/>
+              </a:ext>
+            </a:extLst>
+          </p:cNvPr>
+          <p:cNvSpPr txBox="1"/>
+          <p:nvPr/>
+        </p:nvSpPr>
+        <p:spPr>
+          <a:xfrm>
+            <a:off x="127417" y="903189"/>
+            <a:ext cx="3770584" cy="4623445"/>
+          </a:xfrm>
+          <a:prstGeom prst="rect">
+            <a:avLst/>
+          </a:prstGeom>
+          <a:noFill/>
+        </p:spPr>
+        <p:txBody>
+          <a:bodyPr wrap="none" rtlCol="0">
+            <a:spAutoFit/>
+          </a:bodyPr>
+          <a:lstStyle/>
+          <a:p>
+            <a:pPr marL="0" lvl="1">
+              <a:lnSpc>
+                <a:spcPct val="130000"/>
+              </a:lnSpc>
+              <a:spcBef>
+                <a:spcPts val="1060"/>
+              </a:spcBef>
+              <a:spcAft>
+                <a:spcPts val="600"/>
+              </a:spcAft>
+              <a:tabLst>
+                <a:tab pos="365760" algn="l"/>
+                <a:tab pos="540385" algn="l"/>
+              </a:tabLst>
+            </a:pPr>
+            <a:r>
+              <a:rPr lang="cs-CZ" b="1">
+                <a:latin typeface="Times New Roman" panose="02020603050405020304" pitchFamily="18" charset="0"/>
+              </a:rPr>
+              <a:t>Použité assety: </a:t>
+            </a:r>
+          </a:p>
+          <a:p>
+            <a:pPr marL="1200150" lvl="2" indent="-285750">
+              <a:lnSpc>
+                <a:spcPts val="1000"/>
+              </a:lnSpc>
+              <a:spcBef>
+                <a:spcPts val="1060"/>
+              </a:spcBef>
+              <a:spcAft>
+                <a:spcPts val="600"/>
+              </a:spcAft>
+              <a:buFont typeface="Arial" panose="020B0604020202020204" pitchFamily="34" charset="0"/>
+              <a:buChar char="•"/>
+              <a:tabLst>
+                <a:tab pos="365760" algn="l"/>
+                <a:tab pos="540385" algn="l"/>
+              </a:tabLst>
+            </a:pPr>
+            <a:r>
+              <a:rPr lang="cs-CZ" sz="1600">
+                <a:latin typeface="Times New Roman" panose="02020603050405020304" pitchFamily="18" charset="0"/>
+              </a:rPr>
+              <a:t>noun-mute-border.svg</a:t>
+            </a:r>
+          </a:p>
+          <a:p>
+            <a:pPr marL="1200150" lvl="2" indent="-285750">
+              <a:lnSpc>
+                <a:spcPts val="1000"/>
+              </a:lnSpc>
+              <a:spcBef>
+                <a:spcPts val="1060"/>
+              </a:spcBef>
+              <a:spcAft>
+                <a:spcPts val="600"/>
+              </a:spcAft>
+              <a:buFont typeface="Arial" panose="020B0604020202020204" pitchFamily="34" charset="0"/>
+              <a:buChar char="•"/>
+              <a:tabLst>
+                <a:tab pos="365760" algn="l"/>
+                <a:tab pos="540385" algn="l"/>
+              </a:tabLst>
+            </a:pPr>
+            <a:r>
+              <a:rPr lang="cs-CZ" sz="1600">
+                <a:latin typeface="Times New Roman" panose="02020603050405020304" pitchFamily="18" charset="0"/>
+              </a:rPr>
+              <a:t>noun-speaker.svg</a:t>
+            </a:r>
+          </a:p>
+          <a:p>
+            <a:pPr marL="1200150" lvl="2" indent="-285750">
+              <a:lnSpc>
+                <a:spcPts val="1000"/>
+              </a:lnSpc>
+              <a:spcBef>
+                <a:spcPts val="1060"/>
+              </a:spcBef>
+              <a:spcAft>
+                <a:spcPts val="600"/>
+              </a:spcAft>
+              <a:buFont typeface="Arial" panose="020B0604020202020204" pitchFamily="34" charset="0"/>
+              <a:buChar char="•"/>
+              <a:tabLst>
+                <a:tab pos="365760" algn="l"/>
+                <a:tab pos="540385" algn="l"/>
+              </a:tabLst>
+            </a:pPr>
+            <a:r>
+              <a:rPr lang="cs-CZ" sz="1600">
+                <a:latin typeface="Times New Roman" panose="02020603050405020304" pitchFamily="18" charset="0"/>
+              </a:rPr>
+              <a:t>noun-speaker-border.svg</a:t>
+            </a:r>
+          </a:p>
+          <a:p>
+            <a:pPr marL="1200150" lvl="2" indent="-285750">
+              <a:lnSpc>
+                <a:spcPts val="1000"/>
+              </a:lnSpc>
+              <a:spcBef>
+                <a:spcPts val="1060"/>
+              </a:spcBef>
+              <a:spcAft>
+                <a:spcPts val="600"/>
+              </a:spcAft>
+              <a:buFont typeface="Arial" panose="020B0604020202020204" pitchFamily="34" charset="0"/>
+              <a:buChar char="•"/>
+              <a:tabLst>
+                <a:tab pos="365760" algn="l"/>
+                <a:tab pos="540385" algn="l"/>
+              </a:tabLst>
+            </a:pPr>
+            <a:r>
+              <a:rPr lang="cs-CZ" sz="1600">
+                <a:latin typeface="Times New Roman" panose="02020603050405020304" pitchFamily="18" charset="0"/>
+              </a:rPr>
+              <a:t>slice_0.png – Elena Rašková</a:t>
+            </a:r>
+          </a:p>
+          <a:p>
+            <a:pPr marL="1200150" lvl="2" indent="-285750">
+              <a:lnSpc>
+                <a:spcPts val="1000"/>
+              </a:lnSpc>
+              <a:spcBef>
+                <a:spcPts val="1060"/>
+              </a:spcBef>
+              <a:spcAft>
+                <a:spcPts val="600"/>
+              </a:spcAft>
+              <a:buFont typeface="Arial" panose="020B0604020202020204" pitchFamily="34" charset="0"/>
+              <a:buChar char="•"/>
+              <a:tabLst>
+                <a:tab pos="365760" algn="l"/>
+                <a:tab pos="540385" algn="l"/>
+              </a:tabLst>
+            </a:pPr>
+            <a:r>
+              <a:rPr lang="cs-CZ" sz="1600">
+                <a:latin typeface="Times New Roman" panose="02020603050405020304" pitchFamily="18" charset="0"/>
+              </a:rPr>
+              <a:t>slice_1.png – Elena Rašková</a:t>
+            </a:r>
+          </a:p>
+          <a:p>
+            <a:pPr marL="1200150" lvl="2" indent="-285750">
+              <a:lnSpc>
+                <a:spcPts val="1000"/>
+              </a:lnSpc>
+              <a:spcBef>
+                <a:spcPts val="1060"/>
+              </a:spcBef>
+              <a:spcAft>
+                <a:spcPts val="600"/>
+              </a:spcAft>
+              <a:buFont typeface="Arial" panose="020B0604020202020204" pitchFamily="34" charset="0"/>
+              <a:buChar char="•"/>
+              <a:tabLst>
+                <a:tab pos="365760" algn="l"/>
+                <a:tab pos="540385" algn="l"/>
+              </a:tabLst>
+            </a:pPr>
+            <a:r>
+              <a:rPr lang="cs-CZ" sz="1600">
+                <a:latin typeface="Times New Roman" panose="02020603050405020304" pitchFamily="18" charset="0"/>
+              </a:rPr>
+              <a:t>slice_2.png – Elena Rašková</a:t>
+            </a:r>
+          </a:p>
+          <a:p>
+            <a:pPr marL="1200150" lvl="2" indent="-285750">
+              <a:lnSpc>
+                <a:spcPts val="1000"/>
+              </a:lnSpc>
+              <a:spcBef>
+                <a:spcPts val="1060"/>
+              </a:spcBef>
+              <a:spcAft>
+                <a:spcPts val="600"/>
+              </a:spcAft>
+              <a:buFont typeface="Arial" panose="020B0604020202020204" pitchFamily="34" charset="0"/>
+              <a:buChar char="•"/>
+              <a:tabLst>
+                <a:tab pos="365760" algn="l"/>
+                <a:tab pos="540385" algn="l"/>
+              </a:tabLst>
+            </a:pPr>
+            <a:r>
+              <a:rPr lang="cs-CZ" sz="1600">
+                <a:latin typeface="Times New Roman" panose="02020603050405020304" pitchFamily="18" charset="0"/>
+              </a:rPr>
+              <a:t>slice_3.png – Elena Rašková</a:t>
+            </a:r>
+          </a:p>
+          <a:p>
+            <a:pPr marL="1200150" lvl="2" indent="-285750">
+              <a:lnSpc>
+                <a:spcPts val="1000"/>
+              </a:lnSpc>
+              <a:spcBef>
+                <a:spcPts val="1060"/>
+              </a:spcBef>
+              <a:spcAft>
+                <a:spcPts val="600"/>
+              </a:spcAft>
+              <a:buFont typeface="Arial" panose="020B0604020202020204" pitchFamily="34" charset="0"/>
+              <a:buChar char="•"/>
+              <a:tabLst>
+                <a:tab pos="365760" algn="l"/>
+                <a:tab pos="540385" algn="l"/>
+              </a:tabLst>
+            </a:pPr>
+            <a:r>
+              <a:rPr lang="cs-CZ" sz="1600">
+                <a:latin typeface="Times New Roman" panose="02020603050405020304" pitchFamily="18" charset="0"/>
+              </a:rPr>
+              <a:t>slice_4.png – Elena Rašková</a:t>
+            </a:r>
+          </a:p>
+          <a:p>
+            <a:pPr marL="1200150" lvl="2" indent="-285750">
+              <a:lnSpc>
+                <a:spcPts val="1000"/>
+              </a:lnSpc>
+              <a:spcBef>
+                <a:spcPts val="1060"/>
+              </a:spcBef>
+              <a:spcAft>
+                <a:spcPts val="600"/>
+              </a:spcAft>
+              <a:buFont typeface="Arial" panose="020B0604020202020204" pitchFamily="34" charset="0"/>
+              <a:buChar char="•"/>
+              <a:tabLst>
+                <a:tab pos="365760" algn="l"/>
+                <a:tab pos="540385" algn="l"/>
+              </a:tabLst>
+            </a:pPr>
+            <a:r>
+              <a:rPr lang="cs-CZ" sz="1600">
+                <a:latin typeface="Times New Roman" panose="02020603050405020304" pitchFamily="18" charset="0"/>
+              </a:rPr>
+              <a:t>slice_5.png – Elena Rašková</a:t>
+            </a:r>
+          </a:p>
+          <a:p>
+            <a:pPr marL="1200150" lvl="2" indent="-285750">
+              <a:lnSpc>
+                <a:spcPts val="1000"/>
+              </a:lnSpc>
+              <a:spcBef>
+                <a:spcPts val="1060"/>
+              </a:spcBef>
+              <a:spcAft>
+                <a:spcPts val="600"/>
+              </a:spcAft>
+              <a:buFont typeface="Arial" panose="020B0604020202020204" pitchFamily="34" charset="0"/>
+              <a:buChar char="•"/>
+              <a:tabLst>
+                <a:tab pos="365760" algn="l"/>
+                <a:tab pos="540385" algn="l"/>
+              </a:tabLst>
+            </a:pPr>
+            <a:r>
+              <a:rPr lang="cs-CZ" sz="1600">
+                <a:latin typeface="Times New Roman" panose="02020603050405020304" pitchFamily="18" charset="0"/>
+              </a:rPr>
+              <a:t>slice_6.png – Elena Rašková</a:t>
+            </a:r>
+          </a:p>
+          <a:p>
+            <a:pPr marL="1200150" lvl="2" indent="-285750">
+              <a:lnSpc>
+                <a:spcPts val="1000"/>
+              </a:lnSpc>
+              <a:spcBef>
+                <a:spcPts val="1060"/>
+              </a:spcBef>
+              <a:spcAft>
+                <a:spcPts val="600"/>
+              </a:spcAft>
+              <a:buFont typeface="Arial" panose="020B0604020202020204" pitchFamily="34" charset="0"/>
+              <a:buChar char="•"/>
+              <a:tabLst>
+                <a:tab pos="365760" algn="l"/>
+                <a:tab pos="540385" algn="l"/>
+              </a:tabLst>
+            </a:pPr>
+            <a:r>
+              <a:rPr lang="cs-CZ" sz="1600">
+                <a:latin typeface="Times New Roman" panose="02020603050405020304" pitchFamily="18" charset="0"/>
+              </a:rPr>
+              <a:t>slice_7.png – Elena Rašková</a:t>
+            </a:r>
+          </a:p>
+          <a:p>
+            <a:pPr marL="1200150" lvl="2" indent="-285750">
+              <a:lnSpc>
+                <a:spcPts val="1000"/>
+              </a:lnSpc>
+              <a:spcBef>
+                <a:spcPts val="1060"/>
+              </a:spcBef>
+              <a:spcAft>
+                <a:spcPts val="600"/>
+              </a:spcAft>
+              <a:buFont typeface="Arial" panose="020B0604020202020204" pitchFamily="34" charset="0"/>
+              <a:buChar char="•"/>
+              <a:tabLst>
+                <a:tab pos="365760" algn="l"/>
+                <a:tab pos="540385" algn="l"/>
+              </a:tabLst>
+            </a:pPr>
+            <a:r>
+              <a:rPr lang="cs-CZ" sz="1600">
+                <a:latin typeface="Times New Roman" panose="02020603050405020304" pitchFamily="18" charset="0"/>
+              </a:rPr>
+              <a:t>slice_8.png – Elena Rašková</a:t>
+            </a:r>
+          </a:p>
+        </p:txBody>
+      </p:sp>
     </p:spTree>
     <p:extLst>
       <p:ext uri="{BB962C8B-B14F-4D97-AF65-F5344CB8AC3E}">
@@ -9848,8 +10848,8 @@
         </p:nvSpPr>
         <p:spPr>
           <a:xfrm>
-            <a:off x="134912" y="410746"/>
-            <a:ext cx="9233554" cy="492443"/>
+            <a:off x="127417" y="410746"/>
+            <a:ext cx="9070560" cy="492443"/>
           </a:xfrm>
           <a:prstGeom prst="rect">
             <a:avLst/>
@@ -9889,7 +10889,513 @@
                 </a:solidFill>
                 <a:ea typeface="DejaVu Sans"/>
               </a:rPr>
-              <a:t>5 / Ukázky ze hry</a:t>
+              <a:t>4 / Použité nástroje a assety</a:t>
+            </a:r>
+            <a:endParaRPr lang="cs-CZ" sz="3200" b="0" strike="noStrike" spc="-1"/>
+          </a:p>
+        </p:txBody>
+      </p:sp>
+      <p:sp>
+        <p:nvSpPr>
+          <p:cNvPr id="2" name="TextovéPole 1">
+            <a:extLst>
+              <a:ext uri="{FF2B5EF4-FFF2-40B4-BE49-F238E27FC236}">
+                <a16:creationId xmlns:a16="http://schemas.microsoft.com/office/drawing/2014/main" id="{B3A9FEB0-995F-889E-E610-014FD9776C52}"/>
+              </a:ext>
+            </a:extLst>
+          </p:cNvPr>
+          <p:cNvSpPr txBox="1"/>
+          <p:nvPr/>
+        </p:nvSpPr>
+        <p:spPr>
+          <a:xfrm>
+            <a:off x="127417" y="713100"/>
+            <a:ext cx="7389139" cy="6700937"/>
+          </a:xfrm>
+          <a:prstGeom prst="rect">
+            <a:avLst/>
+          </a:prstGeom>
+          <a:noFill/>
+        </p:spPr>
+        <p:txBody>
+          <a:bodyPr wrap="none" rtlCol="0">
+            <a:spAutoFit/>
+          </a:bodyPr>
+          <a:lstStyle/>
+          <a:p>
+            <a:pPr marL="0" lvl="1">
+              <a:lnSpc>
+                <a:spcPct val="130000"/>
+              </a:lnSpc>
+              <a:spcBef>
+                <a:spcPts val="1060"/>
+              </a:spcBef>
+              <a:spcAft>
+                <a:spcPts val="600"/>
+              </a:spcAft>
+              <a:tabLst>
+                <a:tab pos="365760" algn="l"/>
+                <a:tab pos="540385" algn="l"/>
+              </a:tabLst>
+            </a:pPr>
+            <a:r>
+              <a:rPr lang="cs-CZ" b="1">
+                <a:latin typeface="Times New Roman" panose="02020603050405020304" pitchFamily="18" charset="0"/>
+              </a:rPr>
+              <a:t>Použité assety:</a:t>
+            </a:r>
+          </a:p>
+          <a:p>
+            <a:pPr marL="1200150" lvl="2" indent="-285750">
+              <a:lnSpc>
+                <a:spcPts val="1000"/>
+              </a:lnSpc>
+              <a:spcBef>
+                <a:spcPts val="1060"/>
+              </a:spcBef>
+              <a:spcAft>
+                <a:spcPts val="600"/>
+              </a:spcAft>
+              <a:buFont typeface="Arial" panose="020B0604020202020204" pitchFamily="34" charset="0"/>
+              <a:buChar char="•"/>
+              <a:tabLst>
+                <a:tab pos="365760" algn="l"/>
+                <a:tab pos="540385" algn="l"/>
+              </a:tabLst>
+            </a:pPr>
+            <a:r>
+              <a:rPr lang="cs-CZ" sz="1600">
+                <a:latin typeface="Times New Roman" panose="02020603050405020304" pitchFamily="18" charset="0"/>
+              </a:rPr>
+              <a:t>sprite.gif – Elena Rašková</a:t>
+            </a:r>
+          </a:p>
+          <a:p>
+            <a:pPr marL="1200150" lvl="2" indent="-285750">
+              <a:lnSpc>
+                <a:spcPts val="1000"/>
+              </a:lnSpc>
+              <a:spcBef>
+                <a:spcPts val="1060"/>
+              </a:spcBef>
+              <a:spcAft>
+                <a:spcPts val="600"/>
+              </a:spcAft>
+              <a:buFont typeface="Arial" panose="020B0604020202020204" pitchFamily="34" charset="0"/>
+              <a:buChar char="•"/>
+              <a:tabLst>
+                <a:tab pos="365760" algn="l"/>
+                <a:tab pos="540385" algn="l"/>
+              </a:tabLst>
+            </a:pPr>
+            <a:r>
+              <a:rPr lang="cs-CZ" sz="1600">
+                <a:latin typeface="Times New Roman" panose="02020603050405020304" pitchFamily="18" charset="0"/>
+              </a:rPr>
+              <a:t>spriteone.png – Elena Rašková</a:t>
+            </a:r>
+          </a:p>
+          <a:p>
+            <a:pPr marL="1200150" lvl="2" indent="-285750">
+              <a:lnSpc>
+                <a:spcPts val="1000"/>
+              </a:lnSpc>
+              <a:spcBef>
+                <a:spcPts val="1060"/>
+              </a:spcBef>
+              <a:spcAft>
+                <a:spcPts val="600"/>
+              </a:spcAft>
+              <a:buFont typeface="Arial" panose="020B0604020202020204" pitchFamily="34" charset="0"/>
+              <a:buChar char="•"/>
+              <a:tabLst>
+                <a:tab pos="365760" algn="l"/>
+                <a:tab pos="540385" algn="l"/>
+              </a:tabLst>
+            </a:pPr>
+            <a:r>
+              <a:rPr lang="cs-CZ" sz="1600">
+                <a:latin typeface="Times New Roman" panose="02020603050405020304" pitchFamily="18" charset="0"/>
+              </a:rPr>
+              <a:t>uLose.png – Elena Rašková</a:t>
+            </a:r>
+          </a:p>
+          <a:p>
+            <a:pPr marL="1200150" lvl="2" indent="-285750">
+              <a:lnSpc>
+                <a:spcPts val="1000"/>
+              </a:lnSpc>
+              <a:spcBef>
+                <a:spcPts val="1060"/>
+              </a:spcBef>
+              <a:spcAft>
+                <a:spcPts val="600"/>
+              </a:spcAft>
+              <a:buFont typeface="Arial" panose="020B0604020202020204" pitchFamily="34" charset="0"/>
+              <a:buChar char="•"/>
+              <a:tabLst>
+                <a:tab pos="365760" algn="l"/>
+                <a:tab pos="540385" algn="l"/>
+              </a:tabLst>
+            </a:pPr>
+            <a:r>
+              <a:rPr lang="cs-CZ" sz="1600">
+                <a:latin typeface="Times New Roman" panose="02020603050405020304" pitchFamily="18" charset="0"/>
+              </a:rPr>
+              <a:t>Untitled_Artwork59.png – Elena Rašková</a:t>
+            </a:r>
+          </a:p>
+          <a:p>
+            <a:pPr marL="1200150" lvl="2" indent="-285750">
+              <a:lnSpc>
+                <a:spcPts val="1000"/>
+              </a:lnSpc>
+              <a:spcBef>
+                <a:spcPts val="1060"/>
+              </a:spcBef>
+              <a:spcAft>
+                <a:spcPts val="600"/>
+              </a:spcAft>
+              <a:buFont typeface="Arial" panose="020B0604020202020204" pitchFamily="34" charset="0"/>
+              <a:buChar char="•"/>
+              <a:tabLst>
+                <a:tab pos="365760" algn="l"/>
+                <a:tab pos="540385" algn="l"/>
+              </a:tabLst>
+            </a:pPr>
+            <a:r>
+              <a:rPr lang="cs-CZ" sz="1600">
+                <a:latin typeface="Times New Roman" panose="02020603050405020304" pitchFamily="18" charset="0"/>
+              </a:rPr>
+              <a:t>uWin.png – Elena Rašková</a:t>
+            </a:r>
+          </a:p>
+          <a:p>
+            <a:pPr marL="1200150" lvl="2" indent="-285750">
+              <a:lnSpc>
+                <a:spcPts val="1000"/>
+              </a:lnSpc>
+              <a:spcBef>
+                <a:spcPts val="1060"/>
+              </a:spcBef>
+              <a:spcAft>
+                <a:spcPts val="600"/>
+              </a:spcAft>
+              <a:buFont typeface="Arial" panose="020B0604020202020204" pitchFamily="34" charset="0"/>
+              <a:buChar char="•"/>
+              <a:tabLst>
+                <a:tab pos="365760" algn="l"/>
+                <a:tab pos="540385" algn="l"/>
+              </a:tabLst>
+            </a:pPr>
+            <a:r>
+              <a:rPr lang="cs-CZ" sz="1600">
+                <a:latin typeface="Times New Roman" panose="02020603050405020304" pitchFamily="18" charset="0"/>
+              </a:rPr>
+              <a:t>ConcertOne-Regular.ttf</a:t>
+            </a:r>
+          </a:p>
+          <a:p>
+            <a:pPr marL="1200150" lvl="2" indent="-285750">
+              <a:lnSpc>
+                <a:spcPts val="1000"/>
+              </a:lnSpc>
+              <a:spcBef>
+                <a:spcPts val="1060"/>
+              </a:spcBef>
+              <a:spcAft>
+                <a:spcPts val="600"/>
+              </a:spcAft>
+              <a:buFont typeface="Arial" panose="020B0604020202020204" pitchFamily="34" charset="0"/>
+              <a:buChar char="•"/>
+              <a:tabLst>
+                <a:tab pos="365760" algn="l"/>
+                <a:tab pos="540385" algn="l"/>
+              </a:tabLst>
+            </a:pPr>
+            <a:r>
+              <a:rPr lang="cs-CZ" sz="1600">
+                <a:latin typeface="Times New Roman" panose="02020603050405020304" pitchFamily="18" charset="0"/>
+              </a:rPr>
+              <a:t>LibreBaskerville-Bold.ttf</a:t>
+            </a:r>
+          </a:p>
+          <a:p>
+            <a:pPr marL="1200150" lvl="2" indent="-285750">
+              <a:lnSpc>
+                <a:spcPts val="1000"/>
+              </a:lnSpc>
+              <a:spcBef>
+                <a:spcPts val="1060"/>
+              </a:spcBef>
+              <a:spcAft>
+                <a:spcPts val="600"/>
+              </a:spcAft>
+              <a:buFont typeface="Arial" panose="020B0604020202020204" pitchFamily="34" charset="0"/>
+              <a:buChar char="•"/>
+              <a:tabLst>
+                <a:tab pos="365760" algn="l"/>
+                <a:tab pos="540385" algn="l"/>
+              </a:tabLst>
+            </a:pPr>
+            <a:r>
+              <a:rPr lang="cs-CZ" sz="1600">
+                <a:latin typeface="Times New Roman" panose="02020603050405020304" pitchFamily="18" charset="0"/>
+              </a:rPr>
+              <a:t>background_music.mp3</a:t>
+            </a:r>
+          </a:p>
+          <a:p>
+            <a:pPr marL="1200150" lvl="2" indent="-285750">
+              <a:lnSpc>
+                <a:spcPts val="1000"/>
+              </a:lnSpc>
+              <a:spcBef>
+                <a:spcPts val="1060"/>
+              </a:spcBef>
+              <a:spcAft>
+                <a:spcPts val="600"/>
+              </a:spcAft>
+              <a:buFont typeface="Arial" panose="020B0604020202020204" pitchFamily="34" charset="0"/>
+              <a:buChar char="•"/>
+              <a:tabLst>
+                <a:tab pos="365760" algn="l"/>
+                <a:tab pos="540385" algn="l"/>
+              </a:tabLst>
+            </a:pPr>
+            <a:r>
+              <a:rPr lang="cs-CZ" sz="1600">
+                <a:latin typeface="Times New Roman" panose="02020603050405020304" pitchFamily="18" charset="0"/>
+              </a:rPr>
+              <a:t>clapping-music-for-typographic-video-version-2-112975.mp3</a:t>
+            </a:r>
+          </a:p>
+          <a:p>
+            <a:pPr marL="1200150" lvl="2" indent="-285750">
+              <a:lnSpc>
+                <a:spcPts val="1000"/>
+              </a:lnSpc>
+              <a:spcBef>
+                <a:spcPts val="1060"/>
+              </a:spcBef>
+              <a:spcAft>
+                <a:spcPts val="600"/>
+              </a:spcAft>
+              <a:buFont typeface="Arial" panose="020B0604020202020204" pitchFamily="34" charset="0"/>
+              <a:buChar char="•"/>
+              <a:tabLst>
+                <a:tab pos="365760" algn="l"/>
+                <a:tab pos="540385" algn="l"/>
+              </a:tabLst>
+            </a:pPr>
+            <a:r>
+              <a:rPr lang="en-US" sz="1600">
+                <a:latin typeface="Times New Roman" panose="02020603050405020304" pitchFamily="18" charset="0"/>
+              </a:rPr>
+              <a:t>cute_level_up_2.mp3</a:t>
+            </a:r>
+            <a:endParaRPr lang="cs-CZ" sz="1600">
+              <a:latin typeface="Times New Roman" panose="02020603050405020304" pitchFamily="18" charset="0"/>
+            </a:endParaRPr>
+          </a:p>
+          <a:p>
+            <a:pPr marL="1200150" lvl="2" indent="-285750">
+              <a:lnSpc>
+                <a:spcPts val="1000"/>
+              </a:lnSpc>
+              <a:spcBef>
+                <a:spcPts val="1060"/>
+              </a:spcBef>
+              <a:spcAft>
+                <a:spcPts val="600"/>
+              </a:spcAft>
+              <a:buFont typeface="Arial" panose="020B0604020202020204" pitchFamily="34" charset="0"/>
+              <a:buChar char="•"/>
+              <a:tabLst>
+                <a:tab pos="365760" algn="l"/>
+                <a:tab pos="540385" algn="l"/>
+              </a:tabLst>
+            </a:pPr>
+            <a:r>
+              <a:rPr lang="cs-CZ" sz="1600">
+                <a:latin typeface="Times New Roman" panose="02020603050405020304" pitchFamily="18" charset="0"/>
+              </a:rPr>
+              <a:t>cute-character-wee-1-188162.mp3</a:t>
+            </a:r>
+          </a:p>
+          <a:p>
+            <a:pPr marL="1200150" lvl="2" indent="-285750">
+              <a:lnSpc>
+                <a:spcPts val="1000"/>
+              </a:lnSpc>
+              <a:spcBef>
+                <a:spcPts val="1060"/>
+              </a:spcBef>
+              <a:spcAft>
+                <a:spcPts val="600"/>
+              </a:spcAft>
+              <a:buFont typeface="Arial" panose="020B0604020202020204" pitchFamily="34" charset="0"/>
+              <a:buChar char="•"/>
+              <a:tabLst>
+                <a:tab pos="365760" algn="l"/>
+                <a:tab pos="540385" algn="l"/>
+              </a:tabLst>
+            </a:pPr>
+            <a:r>
+              <a:rPr lang="cs-CZ" sz="1600">
+                <a:latin typeface="Times New Roman" panose="02020603050405020304" pitchFamily="18" charset="0"/>
+              </a:rPr>
+              <a:t>energetic-clapping-music-for-typographic-video-loop-claps-112977.mp3</a:t>
+            </a:r>
+          </a:p>
+          <a:p>
+            <a:pPr marL="1200150" lvl="2" indent="-285750">
+              <a:lnSpc>
+                <a:spcPts val="1000"/>
+              </a:lnSpc>
+              <a:spcBef>
+                <a:spcPts val="1060"/>
+              </a:spcBef>
+              <a:spcAft>
+                <a:spcPts val="600"/>
+              </a:spcAft>
+              <a:buFont typeface="Arial" panose="020B0604020202020204" pitchFamily="34" charset="0"/>
+              <a:buChar char="•"/>
+              <a:tabLst>
+                <a:tab pos="365760" algn="l"/>
+                <a:tab pos="540385" algn="l"/>
+              </a:tabLst>
+            </a:pPr>
+            <a:r>
+              <a:rPr lang="cs-CZ" sz="1600">
+                <a:latin typeface="Times New Roman" panose="02020603050405020304" pitchFamily="18" charset="0"/>
+              </a:rPr>
+              <a:t>loose_game.mp3</a:t>
+            </a:r>
+          </a:p>
+          <a:p>
+            <a:pPr marL="1200150" lvl="2" indent="-285750">
+              <a:lnSpc>
+                <a:spcPts val="1000"/>
+              </a:lnSpc>
+              <a:spcBef>
+                <a:spcPts val="1060"/>
+              </a:spcBef>
+              <a:spcAft>
+                <a:spcPts val="600"/>
+              </a:spcAft>
+              <a:buFont typeface="Arial" panose="020B0604020202020204" pitchFamily="34" charset="0"/>
+              <a:buChar char="•"/>
+              <a:tabLst>
+                <a:tab pos="365760" algn="l"/>
+                <a:tab pos="540385" algn="l"/>
+              </a:tabLst>
+            </a:pPr>
+            <a:r>
+              <a:rPr lang="cs-CZ" sz="1600">
+                <a:latin typeface="Times New Roman" panose="02020603050405020304" pitchFamily="18" charset="0"/>
+              </a:rPr>
+              <a:t>lose_cake.mp3</a:t>
+            </a:r>
+          </a:p>
+          <a:p>
+            <a:pPr marL="1200150" lvl="2" indent="-285750">
+              <a:lnSpc>
+                <a:spcPts val="1000"/>
+              </a:lnSpc>
+              <a:spcBef>
+                <a:spcPts val="1060"/>
+              </a:spcBef>
+              <a:spcAft>
+                <a:spcPts val="600"/>
+              </a:spcAft>
+              <a:buFont typeface="Arial" panose="020B0604020202020204" pitchFamily="34" charset="0"/>
+              <a:buChar char="•"/>
+              <a:tabLst>
+                <a:tab pos="365760" algn="l"/>
+                <a:tab pos="540385" algn="l"/>
+              </a:tabLst>
+            </a:pPr>
+            <a:r>
+              <a:rPr lang="cs-CZ" sz="1600">
+                <a:latin typeface="Times New Roman" panose="02020603050405020304" pitchFamily="18" charset="0"/>
+              </a:rPr>
+              <a:t>sad-violin-[hq]-made-with-Voicemod.mp3</a:t>
+            </a:r>
+          </a:p>
+          <a:p>
+            <a:pPr marL="1200150" lvl="2" indent="-285750">
+              <a:lnSpc>
+                <a:spcPts val="1000"/>
+              </a:lnSpc>
+              <a:spcBef>
+                <a:spcPts val="1060"/>
+              </a:spcBef>
+              <a:spcAft>
+                <a:spcPts val="600"/>
+              </a:spcAft>
+              <a:buFont typeface="Arial" panose="020B0604020202020204" pitchFamily="34" charset="0"/>
+              <a:buChar char="•"/>
+              <a:tabLst>
+                <a:tab pos="365760" algn="l"/>
+                <a:tab pos="540385" algn="l"/>
+              </a:tabLst>
+            </a:pPr>
+            <a:r>
+              <a:rPr lang="cs-CZ" sz="1600">
+                <a:latin typeface="Times New Roman" panose="02020603050405020304" pitchFamily="18" charset="0"/>
+              </a:rPr>
+              <a:t>sinister-laugh-140131.mp3</a:t>
+            </a:r>
+          </a:p>
+          <a:p>
+            <a:pPr marL="1200150" lvl="2" indent="-285750">
+              <a:lnSpc>
+                <a:spcPts val="1000"/>
+              </a:lnSpc>
+              <a:spcBef>
+                <a:spcPts val="1060"/>
+              </a:spcBef>
+              <a:spcAft>
+                <a:spcPts val="600"/>
+              </a:spcAft>
+              <a:buFont typeface="Arial" panose="020B0604020202020204" pitchFamily="34" charset="0"/>
+              <a:buChar char="•"/>
+              <a:tabLst>
+                <a:tab pos="365760" algn="l"/>
+                <a:tab pos="540385" algn="l"/>
+              </a:tabLst>
+            </a:pPr>
+            <a:r>
+              <a:rPr lang="cs-CZ" sz="1600">
+                <a:latin typeface="Times New Roman" panose="02020603050405020304" pitchFamily="18" charset="0"/>
+              </a:rPr>
+              <a:t>surprise.mp3</a:t>
+            </a:r>
+          </a:p>
+          <a:p>
+            <a:pPr marL="1200150" lvl="2" indent="-285750">
+              <a:lnSpc>
+                <a:spcPts val="1000"/>
+              </a:lnSpc>
+              <a:spcBef>
+                <a:spcPts val="1060"/>
+              </a:spcBef>
+              <a:spcAft>
+                <a:spcPts val="600"/>
+              </a:spcAft>
+              <a:buFont typeface="Arial" panose="020B0604020202020204" pitchFamily="34" charset="0"/>
+              <a:buChar char="•"/>
+              <a:tabLst>
+                <a:tab pos="365760" algn="l"/>
+                <a:tab pos="540385" algn="l"/>
+              </a:tabLst>
+            </a:pPr>
+            <a:r>
+              <a:rPr lang="cs-CZ" sz="1600">
+                <a:latin typeface="Times New Roman" panose="02020603050405020304" pitchFamily="18" charset="0"/>
+              </a:rPr>
+              <a:t>worlds-smallest-violin-made-with-Voicemod.mp3</a:t>
             </a:r>
           </a:p>
         </p:txBody>
@@ -9897,7 +11403,7 @@
     </p:spTree>
     <p:extLst>
       <p:ext uri="{BB962C8B-B14F-4D97-AF65-F5344CB8AC3E}">
-        <p14:creationId xmlns:p14="http://schemas.microsoft.com/office/powerpoint/2010/main" val="1800247840"/>
+        <p14:creationId xmlns:p14="http://schemas.microsoft.com/office/powerpoint/2010/main" val="1086382249"/>
       </p:ext>
     </p:extLst>
   </p:cSld>
@@ -10033,10 +11539,46 @@
           </a:p>
         </p:txBody>
       </p:sp>
+      <p:pic>
+        <p:nvPicPr>
+          <p:cNvPr id="3" name="Obrázek 2">
+            <a:extLst>
+              <a:ext uri="{FF2B5EF4-FFF2-40B4-BE49-F238E27FC236}">
+                <a16:creationId xmlns:a16="http://schemas.microsoft.com/office/drawing/2014/main" id="{0951B2A2-1424-CBBF-8F35-05311906169F}"/>
+              </a:ext>
+            </a:extLst>
+          </p:cNvPr>
+          <p:cNvPicPr>
+            <a:picLocks noChangeAspect="1"/>
+          </p:cNvPicPr>
+          <p:nvPr/>
+        </p:nvPicPr>
+        <p:blipFill>
+          <a:blip r:embed="rId3">
+            <a:extLst>
+              <a:ext uri="{28A0092B-C50C-407E-A947-70E740481C1C}">
+                <a14:useLocalDpi xmlns:a14="http://schemas.microsoft.com/office/drawing/2010/main" val="0"/>
+              </a:ext>
+            </a:extLst>
+          </a:blip>
+          <a:stretch>
+            <a:fillRect/>
+          </a:stretch>
+        </p:blipFill>
+        <p:spPr>
+          <a:xfrm>
+            <a:off x="1025718" y="903189"/>
+            <a:ext cx="8029187" cy="4541281"/>
+          </a:xfrm>
+          <a:prstGeom prst="rect">
+            <a:avLst/>
+          </a:prstGeom>
+        </p:spPr>
+      </p:pic>
     </p:spTree>
     <p:extLst>
       <p:ext uri="{BB962C8B-B14F-4D97-AF65-F5344CB8AC3E}">
-        <p14:creationId xmlns:p14="http://schemas.microsoft.com/office/powerpoint/2010/main" val="3623076672"/>
+        <p14:creationId xmlns:p14="http://schemas.microsoft.com/office/powerpoint/2010/main" val="1800247840"/>
       </p:ext>
     </p:extLst>
   </p:cSld>

</xml_diff>

<commit_message>
Edited presentation and idea.md
</commit_message>
<xml_diff>
--- a/Gregs Game.pptx
+++ b/Gregs Game.pptx
@@ -1,16 +1,16 @@
 
 <file path=ppt/presentation.xml><?xml version="1.0" encoding="utf-8"?>
-<p:presentation xmlns:a="http://schemas.openxmlformats.org/drawingml/2006/main" xmlns:r="http://schemas.openxmlformats.org/officeDocument/2006/relationships" xmlns:p="http://schemas.openxmlformats.org/presentationml/2006/main">
+<p:presentation xmlns:a="http://schemas.openxmlformats.org/drawingml/2006/main" xmlns:r="http://schemas.openxmlformats.org/officeDocument/2006/relationships" xmlns:p="http://schemas.openxmlformats.org/presentationml/2006/main" showSpecialPlsOnTitleSld="0">
   <p:sldMasterIdLst>
     <p:sldMasterId id="2147483648" r:id="rId1"/>
     <p:sldMasterId id="2147483674" r:id="rId2"/>
     <p:sldMasterId id="2147483687" r:id="rId3"/>
   </p:sldMasterIdLst>
   <p:notesMasterIdLst>
-    <p:notesMasterId r:id="rId16"/>
+    <p:notesMasterId r:id="rId17"/>
   </p:notesMasterIdLst>
   <p:handoutMasterIdLst>
-    <p:handoutMasterId r:id="rId17"/>
+    <p:handoutMasterId r:id="rId18"/>
   </p:handoutMasterIdLst>
   <p:sldIdLst>
     <p:sldId id="256" r:id="rId4"/>
@@ -23,8 +23,9 @@
     <p:sldId id="287" r:id="rId11"/>
     <p:sldId id="266" r:id="rId12"/>
     <p:sldId id="286" r:id="rId13"/>
-    <p:sldId id="271" r:id="rId14"/>
-    <p:sldId id="262" r:id="rId15"/>
+    <p:sldId id="288" r:id="rId14"/>
+    <p:sldId id="271" r:id="rId15"/>
+    <p:sldId id="262" r:id="rId16"/>
   </p:sldIdLst>
   <p:sldSz cx="10080625" cy="5670550"/>
   <p:notesSz cx="7559675" cy="10691813"/>
@@ -845,6 +846,67 @@
     </p:spTree>
     <p:extLst>
       <p:ext uri="{BB962C8B-B14F-4D97-AF65-F5344CB8AC3E}">
+        <p14:creationId xmlns:p14="http://schemas.microsoft.com/office/powerpoint/2010/main" val="3381253749"/>
+      </p:ext>
+    </p:extLst>
+  </p:cSld>
+  <p:clrMapOvr>
+    <a:masterClrMapping/>
+  </p:clrMapOvr>
+</p:notes>
+</file>
+
+<file path=ppt/notesSlides/notesSlide12.xml><?xml version="1.0" encoding="utf-8"?>
+<p:notes xmlns:a="http://schemas.openxmlformats.org/drawingml/2006/main" xmlns:r="http://schemas.openxmlformats.org/officeDocument/2006/relationships" xmlns:p="http://schemas.openxmlformats.org/presentationml/2006/main">
+  <p:cSld>
+    <p:spTree>
+      <p:nvGrpSpPr>
+        <p:cNvPr id="1" name=""/>
+        <p:cNvGrpSpPr/>
+        <p:nvPr/>
+      </p:nvGrpSpPr>
+      <p:grpSpPr>
+        <a:xfrm>
+          <a:off x="0" y="0"/>
+          <a:ext cx="0" cy="0"/>
+          <a:chOff x="0" y="0"/>
+          <a:chExt cx="0" cy="0"/>
+        </a:xfrm>
+      </p:grpSpPr>
+      <p:sp>
+        <p:nvSpPr>
+          <p:cNvPr id="2" name="Zástupný symbol pro obrázek snímku 1"/>
+          <p:cNvSpPr>
+            <a:spLocks noGrp="1" noRot="1" noChangeAspect="1"/>
+          </p:cNvSpPr>
+          <p:nvPr>
+            <p:ph type="sldImg"/>
+          </p:nvPr>
+        </p:nvSpPr>
+        <p:spPr/>
+      </p:sp>
+      <p:sp>
+        <p:nvSpPr>
+          <p:cNvPr id="3" name="Zástupný symbol pro poznámky 2"/>
+          <p:cNvSpPr>
+            <a:spLocks noGrp="1"/>
+          </p:cNvSpPr>
+          <p:nvPr>
+            <p:ph type="body" idx="1"/>
+          </p:nvPr>
+        </p:nvSpPr>
+        <p:spPr/>
+        <p:txBody>
+          <a:bodyPr/>
+          <a:lstStyle/>
+          <a:p>
+            <a:endParaRPr lang="cs-CZ"/>
+          </a:p>
+        </p:txBody>
+      </p:sp>
+    </p:spTree>
+    <p:extLst>
+      <p:ext uri="{BB962C8B-B14F-4D97-AF65-F5344CB8AC3E}">
         <p14:creationId xmlns:p14="http://schemas.microsoft.com/office/powerpoint/2010/main" val="682961947"/>
       </p:ext>
     </p:extLst>
@@ -855,7 +917,7 @@
 </p:notes>
 </file>
 
-<file path=ppt/notesSlides/notesSlide12.xml><?xml version="1.0" encoding="utf-8"?>
+<file path=ppt/notesSlides/notesSlide13.xml><?xml version="1.0" encoding="utf-8"?>
 <p:notes xmlns:a="http://schemas.openxmlformats.org/drawingml/2006/main" xmlns:r="http://schemas.openxmlformats.org/officeDocument/2006/relationships" xmlns:p="http://schemas.openxmlformats.org/presentationml/2006/main">
   <p:cSld>
     <p:spTree>
@@ -5922,7 +5984,7 @@
     <p:sldLayoutId id="2147483659" r:id="rId11"/>
     <p:sldLayoutId id="2147483660" r:id="rId12"/>
   </p:sldLayoutIdLst>
-  <p:hf hdr="0" ftr="0" dt="0"/>
+  <p:hf hdr="0" dt="0"/>
   <p:txStyles>
     <p:titleStyle>
       <a:lvl1pPr algn="l" defTabSz="914400" rtl="0" eaLnBrk="1" latinLnBrk="0" hangingPunct="1">
@@ -6597,7 +6659,7 @@
     <p:sldLayoutId id="2147483685" r:id="rId11"/>
     <p:sldLayoutId id="2147483686" r:id="rId12"/>
   </p:sldLayoutIdLst>
-  <p:hf hdr="0" ftr="0" dt="0"/>
+  <p:hf hdr="0" dt="0"/>
   <p:txStyles>
     <p:titleStyle>
       <a:lvl1pPr algn="l" defTabSz="914400" rtl="0" eaLnBrk="1" latinLnBrk="0" hangingPunct="1">
@@ -7114,7 +7176,7 @@
     <p:sldLayoutId id="2147483698" r:id="rId11"/>
     <p:sldLayoutId id="2147483699" r:id="rId12"/>
   </p:sldLayoutIdLst>
-  <p:hf hdr="0" ftr="0" dt="0"/>
+  <p:hf hdr="0" dt="0"/>
   <p:txStyles>
     <p:titleStyle>
       <a:lvl1pPr algn="l" defTabSz="914400" rtl="0" eaLnBrk="1" latinLnBrk="0" hangingPunct="1">
@@ -7434,7 +7496,7 @@
         </p:nvSpPr>
         <p:spPr>
           <a:xfrm>
-            <a:off x="217357" y="2732040"/>
+            <a:off x="198489" y="2732040"/>
             <a:ext cx="9683646" cy="553998"/>
           </a:xfrm>
           <a:prstGeom prst="rect">
@@ -7671,7 +7733,7 @@
         <p:spPr>
           <a:xfrm>
             <a:off x="134912" y="410746"/>
-            <a:ext cx="9233554" cy="492443"/>
+            <a:ext cx="9233554" cy="984885"/>
           </a:xfrm>
           <a:prstGeom prst="rect">
             <a:avLst/>
@@ -7711,7 +7773,7 @@
                 </a:solidFill>
                 <a:ea typeface="DejaVu Sans"/>
               </a:rPr>
-              <a:t>5 / Ukázky ze hry</a:t>
+              <a:t>5 / Ukázky ze hry VYM2NIT OBRÁZKY ZA FINÁLNMÍ</a:t>
             </a:r>
           </a:p>
         </p:txBody>
@@ -7894,6 +7956,381 @@
       </p:sp>
       <p:sp>
         <p:nvSpPr>
+          <p:cNvPr id="3" name="TextovéPole 2">
+            <a:extLst>
+              <a:ext uri="{FF2B5EF4-FFF2-40B4-BE49-F238E27FC236}">
+                <a16:creationId xmlns:a16="http://schemas.microsoft.com/office/drawing/2014/main" id="{A5E20C67-0A80-D93C-C7B6-4EA38549B18C}"/>
+              </a:ext>
+            </a:extLst>
+          </p:cNvPr>
+          <p:cNvSpPr txBox="1"/>
+          <p:nvPr/>
+        </p:nvSpPr>
+        <p:spPr>
+          <a:xfrm>
+            <a:off x="164892" y="903189"/>
+            <a:ext cx="8302914" cy="4247317"/>
+          </a:xfrm>
+          <a:prstGeom prst="rect">
+            <a:avLst/>
+          </a:prstGeom>
+          <a:noFill/>
+        </p:spPr>
+        <p:txBody>
+          <a:bodyPr wrap="none" rtlCol="0">
+            <a:spAutoFit/>
+          </a:bodyPr>
+          <a:lstStyle/>
+          <a:p>
+            <a:pPr>
+              <a:lnSpc>
+                <a:spcPct val="100000"/>
+              </a:lnSpc>
+            </a:pPr>
+            <a:r>
+              <a:rPr lang="cs-CZ">
+                <a:latin typeface="Times New Roman" panose="02020603050405020304" pitchFamily="18" charset="0"/>
+                <a:ea typeface="Times New Roman" panose="02020603050405020304" pitchFamily="18" charset="0"/>
+              </a:rPr>
+              <a:t>Postup vývoje je podle agile plánu, který je zaznamenán v dokumentu agilePlan.md</a:t>
+            </a:r>
+          </a:p>
+          <a:p>
+            <a:pPr>
+              <a:lnSpc>
+                <a:spcPct val="100000"/>
+              </a:lnSpc>
+            </a:pPr>
+            <a:endParaRPr lang="cs-CZ">
+              <a:latin typeface="Times New Roman" panose="02020603050405020304" pitchFamily="18" charset="0"/>
+              <a:ea typeface="Times New Roman" panose="02020603050405020304" pitchFamily="18" charset="0"/>
+            </a:endParaRPr>
+          </a:p>
+          <a:p>
+            <a:pPr>
+              <a:lnSpc>
+                <a:spcPct val="100000"/>
+              </a:lnSpc>
+            </a:pPr>
+            <a:r>
+              <a:rPr lang="cs-CZ" b="1">
+                <a:latin typeface="Times New Roman" panose="02020603050405020304" pitchFamily="18" charset="0"/>
+                <a:ea typeface="Times New Roman" panose="02020603050405020304" pitchFamily="18" charset="0"/>
+              </a:rPr>
+              <a:t>Vlastnosti hry:</a:t>
+            </a:r>
+          </a:p>
+          <a:p>
+            <a:pPr marL="800100" lvl="1" indent="-342900">
+              <a:buFont typeface="Arial" panose="020B0604020202020204" pitchFamily="34" charset="0"/>
+              <a:buChar char="•"/>
+            </a:pPr>
+            <a:r>
+              <a:rPr lang="cs-CZ">
+                <a:effectLst/>
+                <a:latin typeface="Times New Roman" panose="02020603050405020304" pitchFamily="18" charset="0"/>
+                <a:ea typeface="Times New Roman" panose="02020603050405020304" pitchFamily="18" charset="0"/>
+              </a:rPr>
+              <a:t>Hra je ve 2D formátu.</a:t>
+            </a:r>
+          </a:p>
+          <a:p>
+            <a:pPr marL="342900" indent="-342900">
+              <a:lnSpc>
+                <a:spcPct val="100000"/>
+              </a:lnSpc>
+              <a:buFont typeface="Arial" panose="020B0604020202020204" pitchFamily="34" charset="0"/>
+              <a:buChar char="•"/>
+            </a:pPr>
+            <a:endParaRPr lang="cs-CZ" sz="1800">
+              <a:effectLst/>
+              <a:latin typeface="Times New Roman" panose="02020603050405020304" pitchFamily="18" charset="0"/>
+              <a:ea typeface="Times New Roman" panose="02020603050405020304" pitchFamily="18" charset="0"/>
+            </a:endParaRPr>
+          </a:p>
+          <a:p>
+            <a:pPr marL="800100" lvl="1" indent="-342900">
+              <a:buFont typeface="Arial" panose="020B0604020202020204" pitchFamily="34" charset="0"/>
+              <a:buChar char="•"/>
+            </a:pPr>
+            <a:r>
+              <a:rPr lang="cs-CZ">
+                <a:latin typeface="Times New Roman" panose="02020603050405020304" pitchFamily="18" charset="0"/>
+                <a:ea typeface="Times New Roman" panose="02020603050405020304" pitchFamily="18" charset="0"/>
+              </a:rPr>
+              <a:t>Hra je rychle pochopitelná pro uživatele.</a:t>
+            </a:r>
+          </a:p>
+          <a:p>
+            <a:pPr marL="342900" indent="-342900">
+              <a:lnSpc>
+                <a:spcPct val="100000"/>
+              </a:lnSpc>
+              <a:buFont typeface="Arial" panose="020B0604020202020204" pitchFamily="34" charset="0"/>
+              <a:buChar char="•"/>
+            </a:pPr>
+            <a:endParaRPr lang="cs-CZ" sz="1800">
+              <a:effectLst/>
+              <a:latin typeface="Times New Roman" panose="02020603050405020304" pitchFamily="18" charset="0"/>
+              <a:ea typeface="Times New Roman" panose="02020603050405020304" pitchFamily="18" charset="0"/>
+            </a:endParaRPr>
+          </a:p>
+          <a:p>
+            <a:pPr marL="800100" lvl="1" indent="-342900">
+              <a:buFont typeface="Arial" panose="020B0604020202020204" pitchFamily="34" charset="0"/>
+              <a:buChar char="•"/>
+            </a:pPr>
+            <a:r>
+              <a:rPr lang="cs-CZ">
+                <a:effectLst/>
+                <a:latin typeface="Times New Roman" panose="02020603050405020304" pitchFamily="18" charset="0"/>
+                <a:ea typeface="Times New Roman" panose="02020603050405020304" pitchFamily="18" charset="0"/>
+              </a:rPr>
+              <a:t>Hru je dokončitelná během pár minut.</a:t>
+            </a:r>
+          </a:p>
+          <a:p>
+            <a:pPr marL="342900" indent="-342900">
+              <a:lnSpc>
+                <a:spcPct val="100000"/>
+              </a:lnSpc>
+              <a:buFont typeface="Arial" panose="020B0604020202020204" pitchFamily="34" charset="0"/>
+              <a:buChar char="•"/>
+            </a:pPr>
+            <a:endParaRPr lang="cs-CZ">
+              <a:latin typeface="Times New Roman" panose="02020603050405020304" pitchFamily="18" charset="0"/>
+              <a:ea typeface="Times New Roman" panose="02020603050405020304" pitchFamily="18" charset="0"/>
+            </a:endParaRPr>
+          </a:p>
+          <a:p>
+            <a:pPr marL="800100" lvl="1" indent="-342900">
+              <a:buFont typeface="Arial" panose="020B0604020202020204" pitchFamily="34" charset="0"/>
+              <a:buChar char="•"/>
+            </a:pPr>
+            <a:r>
+              <a:rPr lang="cs-CZ">
+                <a:effectLst/>
+                <a:latin typeface="Times New Roman" panose="02020603050405020304" pitchFamily="18" charset="0"/>
+                <a:ea typeface="Times New Roman" panose="02020603050405020304" pitchFamily="18" charset="0"/>
+              </a:rPr>
+              <a:t>Hra je realizována v herním engine Godot.</a:t>
+            </a:r>
+          </a:p>
+          <a:p>
+            <a:pPr marL="800100" lvl="1" indent="-342900">
+              <a:buFont typeface="Arial" panose="020B0604020202020204" pitchFamily="34" charset="0"/>
+              <a:buChar char="•"/>
+            </a:pPr>
+            <a:endParaRPr lang="cs-CZ" spc="-1">
+              <a:solidFill>
+                <a:srgbClr val="000000"/>
+              </a:solidFill>
+              <a:latin typeface="Times New Roman" panose="02020603050405020304" pitchFamily="18" charset="0"/>
+              <a:ea typeface="DejaVu Sans"/>
+            </a:endParaRPr>
+          </a:p>
+          <a:p>
+            <a:pPr marL="800100" lvl="1" indent="-342900">
+              <a:buFont typeface="Arial" panose="020B0604020202020204" pitchFamily="34" charset="0"/>
+              <a:buChar char="•"/>
+            </a:pPr>
+            <a:r>
+              <a:rPr lang="cs-CZ" spc="-1">
+                <a:solidFill>
+                  <a:srgbClr val="000000"/>
+                </a:solidFill>
+                <a:effectLst/>
+                <a:latin typeface="Times New Roman" panose="02020603050405020304" pitchFamily="18" charset="0"/>
+                <a:ea typeface="DejaVu Sans"/>
+              </a:rPr>
+              <a:t>Zvuk ve hře je možné vypnout.</a:t>
+            </a:r>
+          </a:p>
+          <a:p>
+            <a:pPr marL="342900" indent="-342900">
+              <a:lnSpc>
+                <a:spcPct val="100000"/>
+              </a:lnSpc>
+              <a:buFont typeface="Arial" panose="020B0604020202020204" pitchFamily="34" charset="0"/>
+              <a:buChar char="•"/>
+            </a:pPr>
+            <a:endParaRPr lang="cs-CZ" spc="-1">
+              <a:solidFill>
+                <a:srgbClr val="000000"/>
+              </a:solidFill>
+              <a:latin typeface="Times New Roman" panose="02020603050405020304" pitchFamily="18" charset="0"/>
+              <a:ea typeface="DejaVu Sans"/>
+            </a:endParaRPr>
+          </a:p>
+          <a:p>
+            <a:pPr marL="800100" lvl="1" indent="-342900">
+              <a:buFont typeface="Arial" panose="020B0604020202020204" pitchFamily="34" charset="0"/>
+              <a:buChar char="•"/>
+            </a:pPr>
+            <a:r>
+              <a:rPr lang="cs-CZ" spc="-1">
+                <a:solidFill>
+                  <a:srgbClr val="000000"/>
+                </a:solidFill>
+                <a:effectLst/>
+                <a:latin typeface="Times New Roman" panose="02020603050405020304" pitchFamily="18" charset="0"/>
+                <a:ea typeface="DejaVu Sans"/>
+              </a:rPr>
+              <a:t>Větsina assetů ve hře je vlastní tvorby vyjma fontů, systémových ikon a hudby.</a:t>
+            </a:r>
+            <a:endParaRPr lang="cs-CZ">
+              <a:effectLst/>
+              <a:latin typeface="Times New Roman" panose="02020603050405020304" pitchFamily="18" charset="0"/>
+              <a:ea typeface="Times New Roman" panose="02020603050405020304" pitchFamily="18" charset="0"/>
+            </a:endParaRPr>
+          </a:p>
+          <a:p>
+            <a:endParaRPr lang="cs-CZ"/>
+          </a:p>
+        </p:txBody>
+      </p:sp>
+    </p:spTree>
+    <p:extLst>
+      <p:ext uri="{BB962C8B-B14F-4D97-AF65-F5344CB8AC3E}">
+        <p14:creationId xmlns:p14="http://schemas.microsoft.com/office/powerpoint/2010/main" val="385403090"/>
+      </p:ext>
+    </p:extLst>
+  </p:cSld>
+  <p:clrMapOvr>
+    <a:masterClrMapping/>
+  </p:clrMapOvr>
+</p:sld>
+</file>
+
+<file path=ppt/slides/slide12.xml><?xml version="1.0" encoding="utf-8"?>
+<p:sld xmlns:a="http://schemas.openxmlformats.org/drawingml/2006/main" xmlns:r="http://schemas.openxmlformats.org/officeDocument/2006/relationships" xmlns:p="http://schemas.openxmlformats.org/presentationml/2006/main">
+  <p:cSld>
+    <p:spTree>
+      <p:nvGrpSpPr>
+        <p:cNvPr id="1" name=""/>
+        <p:cNvGrpSpPr/>
+        <p:nvPr/>
+      </p:nvGrpSpPr>
+      <p:grpSpPr>
+        <a:xfrm>
+          <a:off x="0" y="0"/>
+          <a:ext cx="0" cy="0"/>
+          <a:chOff x="0" y="0"/>
+          <a:chExt cx="0" cy="0"/>
+        </a:xfrm>
+      </p:grpSpPr>
+      <p:sp>
+        <p:nvSpPr>
+          <p:cNvPr id="164" name="CustomShape 1"/>
+          <p:cNvSpPr/>
+          <p:nvPr/>
+        </p:nvSpPr>
+        <p:spPr>
+          <a:xfrm>
+            <a:off x="566640" y="226080"/>
+            <a:ext cx="9070560" cy="184666"/>
+          </a:xfrm>
+          <a:prstGeom prst="rect">
+            <a:avLst/>
+          </a:prstGeom>
+          <a:noFill/>
+          <a:ln>
+            <a:noFill/>
+          </a:ln>
+        </p:spPr>
+        <p:style>
+          <a:lnRef idx="0">
+            <a:scrgbClr r="0" g="0" b="0"/>
+          </a:lnRef>
+          <a:fillRef idx="0">
+            <a:scrgbClr r="0" g="0" b="0"/>
+          </a:fillRef>
+          <a:effectRef idx="0">
+            <a:scrgbClr r="0" g="0" b="0"/>
+          </a:effectRef>
+          <a:fontRef idx="minor"/>
+        </p:style>
+        <p:txBody>
+          <a:bodyPr lIns="0" tIns="0" rIns="0" bIns="0">
+            <a:spAutoFit/>
+          </a:bodyPr>
+          <a:lstStyle/>
+          <a:p>
+            <a:pPr>
+              <a:lnSpc>
+                <a:spcPct val="100000"/>
+              </a:lnSpc>
+            </a:pPr>
+            <a:r>
+              <a:rPr lang="cs-CZ" sz="1200" b="1" strike="noStrike" spc="-1">
+                <a:solidFill>
+                  <a:srgbClr val="E8A202"/>
+                </a:solidFill>
+                <a:ea typeface="DejaVu Sans"/>
+              </a:rPr>
+              <a:t>Praktické využití vodopádového modelu</a:t>
+            </a:r>
+            <a:endParaRPr lang="cs-CZ" sz="1200" b="0" strike="noStrike" spc="-1"/>
+          </a:p>
+        </p:txBody>
+      </p:sp>
+      <p:sp>
+        <p:nvSpPr>
+          <p:cNvPr id="165" name="CustomShape 2"/>
+          <p:cNvSpPr/>
+          <p:nvPr/>
+        </p:nvSpPr>
+        <p:spPr>
+          <a:xfrm>
+            <a:off x="164892" y="410746"/>
+            <a:ext cx="6478560" cy="492443"/>
+          </a:xfrm>
+          <a:prstGeom prst="rect">
+            <a:avLst/>
+          </a:prstGeom>
+          <a:noFill/>
+          <a:ln>
+            <a:noFill/>
+          </a:ln>
+        </p:spPr>
+        <p:style>
+          <a:lnRef idx="0">
+            <a:scrgbClr r="0" g="0" b="0"/>
+          </a:lnRef>
+          <a:fillRef idx="0">
+            <a:scrgbClr r="0" g="0" b="0"/>
+          </a:fillRef>
+          <a:effectRef idx="0">
+            <a:scrgbClr r="0" g="0" b="0"/>
+          </a:effectRef>
+          <a:fontRef idx="minor"/>
+        </p:style>
+        <p:txBody>
+          <a:bodyPr lIns="0" tIns="0" rIns="0" bIns="0">
+            <a:spAutoFit/>
+          </a:bodyPr>
+          <a:lstStyle/>
+          <a:p>
+            <a:pPr>
+              <a:lnSpc>
+                <a:spcPct val="100000"/>
+              </a:lnSpc>
+            </a:pPr>
+            <a:r>
+              <a:rPr lang="cs-CZ" sz="3200" b="1" strike="noStrike" spc="-1">
+                <a:solidFill>
+                  <a:srgbClr val="E8A202"/>
+                </a:solidFill>
+                <a:ea typeface="DejaVu Sans"/>
+              </a:rPr>
+              <a:t>6 / Závěr</a:t>
+            </a:r>
+            <a:endParaRPr lang="cs-CZ" sz="3200" b="0" strike="noStrike" spc="-1"/>
+          </a:p>
+        </p:txBody>
+      </p:sp>
+      <p:sp>
+        <p:nvSpPr>
           <p:cNvPr id="2" name="TextovéPole 1">
             <a:extLst>
               <a:ext uri="{FF2B5EF4-FFF2-40B4-BE49-F238E27FC236}">
@@ -7906,7 +8343,7 @@
         </p:nvSpPr>
         <p:spPr>
           <a:xfrm>
-            <a:off x="164892" y="1087855"/>
+            <a:off x="164892" y="903189"/>
             <a:ext cx="8184629" cy="4619213"/>
           </a:xfrm>
           <a:prstGeom prst="rect">
@@ -7929,7 +8366,7 @@
               </a:spcBef>
             </a:pPr>
             <a:r>
-              <a:rPr lang="cs-CZ" sz="1600">
+              <a:rPr lang="cs-CZ" sz="1600" b="1">
                 <a:latin typeface="Times New Roman" panose="02020603050405020304" pitchFamily="18" charset="0"/>
               </a:rPr>
               <a:t>Roman:</a:t>
@@ -8053,7 +8490,7 @@
               </a:spcBef>
             </a:pPr>
             <a:r>
-              <a:rPr lang="cs-CZ" sz="1600">
+              <a:rPr lang="cs-CZ" sz="1600" b="1">
                 <a:latin typeface="Times New Roman" panose="02020603050405020304" pitchFamily="18" charset="0"/>
               </a:rPr>
               <a:t>Michal:</a:t>
@@ -8182,7 +8619,7 @@
 </p:sld>
 </file>
 
-<file path=ppt/slides/slide12.xml><?xml version="1.0" encoding="utf-8"?>
+<file path=ppt/slides/slide13.xml><?xml version="1.0" encoding="utf-8"?>
 <p:sld xmlns:a="http://schemas.openxmlformats.org/drawingml/2006/main" xmlns:r="http://schemas.openxmlformats.org/officeDocument/2006/relationships" xmlns:p="http://schemas.openxmlformats.org/presentationml/2006/main">
   <p:cSld>
     <p:bg>
@@ -9092,7 +9529,7 @@
                 <a:latin typeface="Times New Roman" panose="02020603050405020304" pitchFamily="18" charset="0"/>
                 <a:ea typeface="Times New Roman" panose="02020603050405020304" pitchFamily="18" charset="0"/>
               </a:rPr>
-              <a:t>Hra by měla být ve 2D formátu</a:t>
+              <a:t>Hra by měla být ve 2D formátu.</a:t>
             </a:r>
           </a:p>
           <a:p>
@@ -9122,7 +9559,7 @@
                 <a:latin typeface="Times New Roman" panose="02020603050405020304" pitchFamily="18" charset="0"/>
                 <a:ea typeface="Times New Roman" panose="02020603050405020304" pitchFamily="18" charset="0"/>
               </a:rPr>
-              <a:t>Hra by měla být rychle pochopitelná pro uživatele</a:t>
+              <a:t>Hra by měla být rychle pochopitelná pro uživatele.</a:t>
             </a:r>
           </a:p>
           <a:p>
@@ -9153,7 +9590,7 @@
                 <a:latin typeface="Times New Roman" panose="02020603050405020304" pitchFamily="18" charset="0"/>
                 <a:ea typeface="Times New Roman" panose="02020603050405020304" pitchFamily="18" charset="0"/>
               </a:rPr>
-              <a:t>Hru by měla být dokončitelná během pár minut</a:t>
+              <a:t>Hru by měla být dokončitelná během pár minut.</a:t>
             </a:r>
           </a:p>
           <a:p>
@@ -9183,7 +9620,7 @@
                 <a:latin typeface="Times New Roman" panose="02020603050405020304" pitchFamily="18" charset="0"/>
                 <a:ea typeface="Times New Roman" panose="02020603050405020304" pitchFamily="18" charset="0"/>
               </a:rPr>
-              <a:t>Hra by měla být realizována v herním engine Godot</a:t>
+              <a:t>Hra by měla být realizována v herním engine Godot.</a:t>
             </a:r>
             <a:endParaRPr lang="cs-CZ" sz="1800" spc="-1">
               <a:solidFill>
@@ -9227,7 +9664,7 @@
                 <a:latin typeface="Times New Roman" panose="02020603050405020304" pitchFamily="18" charset="0"/>
                 <a:ea typeface="DejaVu Sans"/>
               </a:rPr>
-              <a:t>Hra by pokud možno měla mít vlastní nebo nelicencované assety pro použití</a:t>
+              <a:t>Hra by pokud možno měla mít vlastní nebo nelicencované assety pro použití.</a:t>
             </a:r>
             <a:endParaRPr lang="cs-CZ" sz="1800">
               <a:effectLst/>
@@ -9534,7 +9971,7 @@
               <a:rPr lang="cs-CZ">
                 <a:latin typeface="Times New Roman" panose="02020603050405020304" pitchFamily="18" charset="0"/>
               </a:rPr>
-              <a:t>Cíl: Pochutnat si na koláči</a:t>
+              <a:t>Cíl: Sesbírat dort</a:t>
             </a:r>
           </a:p>
           <a:p>
@@ -9715,8 +10152,8 @@
         </p:nvSpPr>
         <p:spPr>
           <a:xfrm>
-            <a:off x="134911" y="1057998"/>
-            <a:ext cx="9811063" cy="1545551"/>
+            <a:off x="134911" y="1289724"/>
+            <a:ext cx="9811063" cy="4051365"/>
           </a:xfrm>
           <a:prstGeom prst="rect">
             <a:avLst/>
@@ -9744,7 +10181,45 @@
           </a:bodyPr>
           <a:lstStyle/>
           <a:p>
-            <a:pPr marL="285750" indent="-285750">
+            <a:pPr>
+              <a:lnSpc>
+                <a:spcPct val="130000"/>
+              </a:lnSpc>
+              <a:spcBef>
+                <a:spcPts val="1060"/>
+              </a:spcBef>
+            </a:pPr>
+            <a:r>
+              <a:rPr lang="cs-CZ" b="1">
+                <a:latin typeface="Times New Roman" panose="02020603050405020304" pitchFamily="18" charset="0"/>
+              </a:rPr>
+              <a:t>Sbírání částí dort: </a:t>
+            </a:r>
+            <a:r>
+              <a:rPr lang="cs-CZ">
+                <a:latin typeface="Times New Roman" panose="02020603050405020304" pitchFamily="18" charset="0"/>
+              </a:rPr>
+              <a:t>Ve hře je hlavním cílem posbírat všechny kousky dortu.</a:t>
+            </a:r>
+          </a:p>
+          <a:p>
+            <a:pPr>
+              <a:lnSpc>
+                <a:spcPct val="130000"/>
+              </a:lnSpc>
+              <a:spcBef>
+                <a:spcPts val="1060"/>
+              </a:spcBef>
+            </a:pPr>
+            <a:r>
+              <a:rPr lang="cs-CZ" b="1">
+                <a:latin typeface="Times New Roman" panose="02020603050405020304" pitchFamily="18" charset="0"/>
+              </a:rPr>
+              <a:t>Módy pohybu myši: </a:t>
+            </a:r>
+          </a:p>
+          <a:p>
+            <a:pPr marL="742950" lvl="1" indent="-285750">
               <a:lnSpc>
                 <a:spcPct val="130000"/>
               </a:lnSpc>
@@ -9755,20 +10230,14 @@
               <a:buChar char="•"/>
             </a:pPr>
             <a:r>
-              <a:rPr lang="cs-CZ" b="1">
-                <a:latin typeface="Times New Roman" panose="02020603050405020304" pitchFamily="18" charset="0"/>
-              </a:rPr>
-              <a:t>Sbírání dortů: </a:t>
-            </a:r>
-            <a:r>
               <a:rPr lang="cs-CZ">
                 <a:latin typeface="Times New Roman" panose="02020603050405020304" pitchFamily="18" charset="0"/>
               </a:rPr>
-              <a:t>V hře je hlavním cílem posbírat všechny kousky dortu.</a:t>
-            </a:r>
-          </a:p>
-          <a:p>
-            <a:pPr marL="285750" indent="-285750">
+              <a:t>Myš se pohybuje po prostředí ve dvou módech.</a:t>
+            </a:r>
+          </a:p>
+          <a:p>
+            <a:pPr marL="742950" lvl="1" indent="-285750">
               <a:lnSpc>
                 <a:spcPct val="130000"/>
               </a:lnSpc>
@@ -9779,16 +10248,64 @@
               <a:buChar char="•"/>
             </a:pPr>
             <a:r>
-              <a:rPr lang="cs-CZ" b="1">
-                <a:latin typeface="Times New Roman" panose="02020603050405020304" pitchFamily="18" charset="0"/>
-              </a:rPr>
-              <a:t>Vyhýbání se myši: </a:t>
-            </a:r>
-            <a:r>
               <a:rPr lang="cs-CZ">
                 <a:latin typeface="Times New Roman" panose="02020603050405020304" pitchFamily="18" charset="0"/>
               </a:rPr>
-              <a:t>Myš se pohybuje po prostředí ve třech módech. Snaží se sníst kousky dortu dříve, než je hráč stihne posbírat. Myš se pohybuje po částečně náhodné dráze, takže je nepředvídatelné a náročné se jí vyhnout.</a:t>
+              <a:t>V prvním módu se myš snaží se sníst kousky dortu dříve, než je hráč stihne posbírat.</a:t>
+            </a:r>
+          </a:p>
+          <a:p>
+            <a:pPr marL="742950" lvl="1" indent="-285750">
+              <a:lnSpc>
+                <a:spcPct val="130000"/>
+              </a:lnSpc>
+              <a:spcBef>
+                <a:spcPts val="1060"/>
+              </a:spcBef>
+              <a:buFont typeface="Arial" panose="020B0604020202020204" pitchFamily="34" charset="0"/>
+              <a:buChar char="•"/>
+            </a:pPr>
+            <a:r>
+              <a:rPr lang="cs-CZ">
+                <a:latin typeface="Times New Roman" panose="02020603050405020304" pitchFamily="18" charset="0"/>
+              </a:rPr>
+              <a:t>V druhém módu se myš snaží ukrást dort hráči, pokud se jí to podaří, hráči zmizí jeden kousek dortu z talíře.</a:t>
+            </a:r>
+          </a:p>
+          <a:p>
+            <a:pPr marL="742950" lvl="1" indent="-285750">
+              <a:lnSpc>
+                <a:spcPct val="130000"/>
+              </a:lnSpc>
+              <a:spcBef>
+                <a:spcPts val="1060"/>
+              </a:spcBef>
+              <a:buFont typeface="Arial" panose="020B0604020202020204" pitchFamily="34" charset="0"/>
+              <a:buChar char="•"/>
+            </a:pPr>
+            <a:r>
+              <a:rPr lang="cs-CZ">
+                <a:latin typeface="Times New Roman" panose="02020603050405020304" pitchFamily="18" charset="0"/>
+              </a:rPr>
+              <a:t>Přepínání módů je náhodné, po náhodném počtu úspěšných pokusů myši sebrat dort, nebo sebrat jej hráči.</a:t>
+            </a:r>
+          </a:p>
+          <a:p>
+            <a:pPr marL="742950" lvl="1" indent="-285750">
+              <a:lnSpc>
+                <a:spcPct val="130000"/>
+              </a:lnSpc>
+              <a:spcBef>
+                <a:spcPts val="1060"/>
+              </a:spcBef>
+              <a:buFont typeface="Arial" panose="020B0604020202020204" pitchFamily="34" charset="0"/>
+              <a:buChar char="•"/>
+            </a:pPr>
+            <a:r>
+              <a:rPr lang="cs-CZ">
+                <a:latin typeface="Times New Roman" panose="02020603050405020304" pitchFamily="18" charset="0"/>
+              </a:rPr>
+              <a:t>Spolu s objevením se dortu v hrací ploše pomocí náhodného procesu proces číní hru náročnější.</a:t>
             </a:r>
           </a:p>
         </p:txBody>
@@ -9922,7 +10439,7 @@
                 </a:solidFill>
                 <a:ea typeface="DejaVu Sans"/>
               </a:rPr>
-              <a:t>4 / Použité nástroje a assety </a:t>
+              <a:t>4 / Použité nástroje a assety TODO OPRAVIT </a:t>
             </a:r>
             <a:endParaRPr lang="cs-CZ" sz="3200" b="0" strike="noStrike" spc="-1"/>
           </a:p>
@@ -9965,7 +10482,7 @@
           </a:bodyPr>
           <a:lstStyle/>
           <a:p>
-            <a:pPr marL="285750" lvl="1" indent="-285750">
+            <a:pPr marL="0" lvl="1">
               <a:lnSpc>
                 <a:spcPct val="130000"/>
               </a:lnSpc>
@@ -9975,8 +10492,6 @@
               <a:spcAft>
                 <a:spcPts val="600"/>
               </a:spcAft>
-              <a:buFont typeface="Arial" panose="020B0604020202020204" pitchFamily="34" charset="0"/>
-              <a:buChar char="•"/>
               <a:tabLst>
                 <a:tab pos="365760" algn="l"/>
                 <a:tab pos="540385" algn="l"/>
@@ -10035,7 +10550,7 @@
               <a:rPr lang="cs-CZ">
                 <a:latin typeface="Times New Roman" panose="02020603050405020304" pitchFamily="18" charset="0"/>
               </a:rPr>
-              <a:t>Godot Engine v4.2.1.stable.mono.official [b09f793f5]</a:t>
+              <a:t>Godot Engine v4.2.1.stable.mono.official [b09f793f5].</a:t>
             </a:r>
           </a:p>
           <a:p>
@@ -10060,7 +10575,7 @@
               <a:rPr lang="cs-CZ">
                 <a:latin typeface="Times New Roman" panose="02020603050405020304" pitchFamily="18" charset="0"/>
               </a:rPr>
-              <a:t>Skriptování v jazyce C#, který poskytuje robustní programovací možnosti pro vývoj her</a:t>
+              <a:t>Skriptování v jazyce C#, který poskytuje robustní programovací možnosti pro vývoj her.</a:t>
             </a:r>
           </a:p>
           <a:p>
@@ -10909,7 +11424,7 @@
         </p:nvSpPr>
         <p:spPr>
           <a:xfrm>
-            <a:off x="127417" y="713100"/>
+            <a:off x="127417" y="903189"/>
             <a:ext cx="7389139" cy="6700937"/>
           </a:xfrm>
           <a:prstGeom prst="rect">
@@ -11494,7 +12009,7 @@
         <p:spPr>
           <a:xfrm>
             <a:off x="134912" y="410746"/>
-            <a:ext cx="9233554" cy="492443"/>
+            <a:ext cx="9233554" cy="984885"/>
           </a:xfrm>
           <a:prstGeom prst="rect">
             <a:avLst/>
@@ -11534,7 +12049,7 @@
                 </a:solidFill>
                 <a:ea typeface="DejaVu Sans"/>
               </a:rPr>
-              <a:t>5 / Ukázky ze hry</a:t>
+              <a:t>5 / Ukázky ze hry VYM2NIT OBRÁZKY ZA FINÁLNMÍ</a:t>
             </a:r>
           </a:p>
         </p:txBody>

</xml_diff>